<commit_message>
Added more slides ot spring boot basics presentation.
</commit_message>
<xml_diff>
--- a/files/spring-boot-basics.pptx
+++ b/files/spring-boot-basics.pptx
@@ -28,11 +28,20 @@
     <p:sldId id="275" r:id="rId25"/>
     <p:sldId id="276" r:id="rId26"/>
     <p:sldId id="277" r:id="rId27"/>
-    <p:sldId id="278" r:id="rId28"/>
-    <p:sldId id="279" r:id="rId29"/>
-    <p:sldId id="280" r:id="rId30"/>
-    <p:sldId id="281" r:id="rId31"/>
-    <p:sldId id="282" r:id="rId32"/>
+    <p:sldId id="279" r:id="rId28"/>
+    <p:sldId id="280" r:id="rId29"/>
+    <p:sldId id="281" r:id="rId30"/>
+    <p:sldId id="282" r:id="rId31"/>
+    <p:sldId id="284" r:id="rId32"/>
+    <p:sldId id="285" r:id="rId33"/>
+    <p:sldId id="278" r:id="rId34"/>
+    <p:sldId id="291" r:id="rId35"/>
+    <p:sldId id="286" r:id="rId36"/>
+    <p:sldId id="287" r:id="rId37"/>
+    <p:sldId id="288" r:id="rId38"/>
+    <p:sldId id="289" r:id="rId39"/>
+    <p:sldId id="290" r:id="rId40"/>
+    <p:sldId id="292" r:id="rId41"/>
   </p:sldIdLst>
   <p:sldSz cx="12192000" cy="6858000"/>
   <p:notesSz cx="6858000" cy="9144000"/>
@@ -294,7 +303,7 @@
           <a:p>
             <a:fld id="{E85AC179-74D8-4233-991E-D09988E98AC5}" type="datetimeFigureOut">
               <a:rPr lang="en-US" smtClean="0"/>
-              <a:t>1/21/2020</a:t>
+              <a:t>1/22/2020</a:t>
             </a:fld>
             <a:endParaRPr lang="en-US"/>
           </a:p>
@@ -492,7 +501,7 @@
           <a:p>
             <a:fld id="{E85AC179-74D8-4233-991E-D09988E98AC5}" type="datetimeFigureOut">
               <a:rPr lang="en-US" smtClean="0"/>
-              <a:t>1/21/2020</a:t>
+              <a:t>1/22/2020</a:t>
             </a:fld>
             <a:endParaRPr lang="en-US"/>
           </a:p>
@@ -700,7 +709,7 @@
           <a:p>
             <a:fld id="{E85AC179-74D8-4233-991E-D09988E98AC5}" type="datetimeFigureOut">
               <a:rPr lang="en-US" smtClean="0"/>
-              <a:t>1/21/2020</a:t>
+              <a:t>1/22/2020</a:t>
             </a:fld>
             <a:endParaRPr lang="en-US"/>
           </a:p>
@@ -898,7 +907,7 @@
           <a:p>
             <a:fld id="{E85AC179-74D8-4233-991E-D09988E98AC5}" type="datetimeFigureOut">
               <a:rPr lang="en-US" smtClean="0"/>
-              <a:t>1/21/2020</a:t>
+              <a:t>1/22/2020</a:t>
             </a:fld>
             <a:endParaRPr lang="en-US"/>
           </a:p>
@@ -1173,7 +1182,7 @@
           <a:p>
             <a:fld id="{E85AC179-74D8-4233-991E-D09988E98AC5}" type="datetimeFigureOut">
               <a:rPr lang="en-US" smtClean="0"/>
-              <a:t>1/21/2020</a:t>
+              <a:t>1/22/2020</a:t>
             </a:fld>
             <a:endParaRPr lang="en-US"/>
           </a:p>
@@ -1438,7 +1447,7 @@
           <a:p>
             <a:fld id="{E85AC179-74D8-4233-991E-D09988E98AC5}" type="datetimeFigureOut">
               <a:rPr lang="en-US" smtClean="0"/>
-              <a:t>1/21/2020</a:t>
+              <a:t>1/22/2020</a:t>
             </a:fld>
             <a:endParaRPr lang="en-US"/>
           </a:p>
@@ -1850,7 +1859,7 @@
           <a:p>
             <a:fld id="{E85AC179-74D8-4233-991E-D09988E98AC5}" type="datetimeFigureOut">
               <a:rPr lang="en-US" smtClean="0"/>
-              <a:t>1/21/2020</a:t>
+              <a:t>1/22/2020</a:t>
             </a:fld>
             <a:endParaRPr lang="en-US"/>
           </a:p>
@@ -1991,7 +2000,7 @@
           <a:p>
             <a:fld id="{E85AC179-74D8-4233-991E-D09988E98AC5}" type="datetimeFigureOut">
               <a:rPr lang="en-US" smtClean="0"/>
-              <a:t>1/21/2020</a:t>
+              <a:t>1/22/2020</a:t>
             </a:fld>
             <a:endParaRPr lang="en-US"/>
           </a:p>
@@ -2104,7 +2113,7 @@
           <a:p>
             <a:fld id="{E85AC179-74D8-4233-991E-D09988E98AC5}" type="datetimeFigureOut">
               <a:rPr lang="en-US" smtClean="0"/>
-              <a:t>1/21/2020</a:t>
+              <a:t>1/22/2020</a:t>
             </a:fld>
             <a:endParaRPr lang="en-US"/>
           </a:p>
@@ -2415,7 +2424,7 @@
           <a:p>
             <a:fld id="{E85AC179-74D8-4233-991E-D09988E98AC5}" type="datetimeFigureOut">
               <a:rPr lang="en-US" smtClean="0"/>
-              <a:t>1/21/2020</a:t>
+              <a:t>1/22/2020</a:t>
             </a:fld>
             <a:endParaRPr lang="en-US"/>
           </a:p>
@@ -2703,7 +2712,7 @@
           <a:p>
             <a:fld id="{E85AC179-74D8-4233-991E-D09988E98AC5}" type="datetimeFigureOut">
               <a:rPr lang="en-US" smtClean="0"/>
-              <a:t>1/21/2020</a:t>
+              <a:t>1/22/2020</a:t>
             </a:fld>
             <a:endParaRPr lang="en-US"/>
           </a:p>
@@ -2944,7 +2953,7 @@
           <a:p>
             <a:fld id="{E85AC179-74D8-4233-991E-D09988E98AC5}" type="datetimeFigureOut">
               <a:rPr lang="en-US" smtClean="0"/>
-              <a:t>1/21/2020</a:t>
+              <a:t>1/22/2020</a:t>
             </a:fld>
             <a:endParaRPr lang="en-US"/>
           </a:p>
@@ -5590,72 +5599,6 @@
           <p:cNvPr id="2" name="Title 1">
             <a:extLst>
               <a:ext uri="{FF2B5EF4-FFF2-40B4-BE49-F238E27FC236}">
-                <a16:creationId xmlns:a16="http://schemas.microsoft.com/office/drawing/2014/main" id="{42EAF3E5-A60A-4045-81A1-06B04AB73184}"/>
-              </a:ext>
-            </a:extLst>
-          </p:cNvPr>
-          <p:cNvSpPr>
-            <a:spLocks noGrp="1"/>
-          </p:cNvSpPr>
-          <p:nvPr>
-            <p:ph type="title"/>
-          </p:nvPr>
-        </p:nvSpPr>
-        <p:spPr>
-          <a:xfrm>
-            <a:off x="838200" y="2766218"/>
-            <a:ext cx="10515600" cy="1325563"/>
-          </a:xfrm>
-        </p:spPr>
-        <p:txBody>
-          <a:bodyPr>
-            <a:normAutofit/>
-          </a:bodyPr>
-          <a:lstStyle/>
-          <a:p>
-            <a:pPr algn="ctr"/>
-            <a:r>
-              <a:rPr lang="en-US" dirty="0"/>
-              <a:t>How about none of them.</a:t>
-            </a:r>
-          </a:p>
-        </p:txBody>
-      </p:sp>
-    </p:spTree>
-    <p:extLst>
-      <p:ext uri="{BB962C8B-B14F-4D97-AF65-F5344CB8AC3E}">
-        <p14:creationId xmlns:p14="http://schemas.microsoft.com/office/powerpoint/2010/main" val="717360624"/>
-      </p:ext>
-    </p:extLst>
-  </p:cSld>
-  <p:clrMapOvr>
-    <a:masterClrMapping/>
-  </p:clrMapOvr>
-</p:sld>
-</file>
-
-<file path=ppt/slides/slide25.xml><?xml version="1.0" encoding="utf-8"?>
-<p:sld xmlns:a="http://schemas.openxmlformats.org/drawingml/2006/main" xmlns:r="http://schemas.openxmlformats.org/officeDocument/2006/relationships" xmlns:p="http://schemas.openxmlformats.org/presentationml/2006/main">
-  <p:cSld>
-    <p:spTree>
-      <p:nvGrpSpPr>
-        <p:cNvPr id="1" name=""/>
-        <p:cNvGrpSpPr/>
-        <p:nvPr/>
-      </p:nvGrpSpPr>
-      <p:grpSpPr>
-        <a:xfrm>
-          <a:off x="0" y="0"/>
-          <a:ext cx="0" cy="0"/>
-          <a:chOff x="0" y="0"/>
-          <a:chExt cx="0" cy="0"/>
-        </a:xfrm>
-      </p:grpSpPr>
-      <p:sp>
-        <p:nvSpPr>
-          <p:cNvPr id="2" name="Title 1">
-            <a:extLst>
-              <a:ext uri="{FF2B5EF4-FFF2-40B4-BE49-F238E27FC236}">
                 <a16:creationId xmlns:a16="http://schemas.microsoft.com/office/drawing/2014/main" id="{8D5874CD-6438-4E3B-A107-5D59943A8095}"/>
               </a:ext>
             </a:extLst>
@@ -5764,7 +5707,7 @@
 </p:sld>
 </file>
 
-<file path=ppt/slides/slide26.xml><?xml version="1.0" encoding="utf-8"?>
+<file path=ppt/slides/slide25.xml><?xml version="1.0" encoding="utf-8"?>
 <p:sld xmlns:a="http://schemas.openxmlformats.org/drawingml/2006/main" xmlns:r="http://schemas.openxmlformats.org/officeDocument/2006/relationships" xmlns:p="http://schemas.openxmlformats.org/presentationml/2006/main">
   <p:cSld>
     <p:spTree>
@@ -5886,7 +5829,7 @@
 </p:sld>
 </file>
 
-<file path=ppt/slides/slide27.xml><?xml version="1.0" encoding="utf-8"?>
+<file path=ppt/slides/slide26.xml><?xml version="1.0" encoding="utf-8"?>
 <p:sld xmlns:a="http://schemas.openxmlformats.org/drawingml/2006/main" xmlns:r="http://schemas.openxmlformats.org/officeDocument/2006/relationships" xmlns:p="http://schemas.openxmlformats.org/presentationml/2006/main">
   <p:cSld>
     <p:spTree>
@@ -6015,6 +5958,104 @@
 </p:sld>
 </file>
 
+<file path=ppt/slides/slide27.xml><?xml version="1.0" encoding="utf-8"?>
+<p:sld xmlns:a="http://schemas.openxmlformats.org/drawingml/2006/main" xmlns:r="http://schemas.openxmlformats.org/officeDocument/2006/relationships" xmlns:p="http://schemas.openxmlformats.org/presentationml/2006/main">
+  <p:cSld>
+    <p:spTree>
+      <p:nvGrpSpPr>
+        <p:cNvPr id="1" name=""/>
+        <p:cNvGrpSpPr/>
+        <p:nvPr/>
+      </p:nvGrpSpPr>
+      <p:grpSpPr>
+        <a:xfrm>
+          <a:off x="0" y="0"/>
+          <a:ext cx="0" cy="0"/>
+          <a:chOff x="0" y="0"/>
+          <a:chExt cx="0" cy="0"/>
+        </a:xfrm>
+      </p:grpSpPr>
+      <p:sp>
+        <p:nvSpPr>
+          <p:cNvPr id="2" name="Title 1">
+            <a:extLst>
+              <a:ext uri="{FF2B5EF4-FFF2-40B4-BE49-F238E27FC236}">
+                <a16:creationId xmlns:a16="http://schemas.microsoft.com/office/drawing/2014/main" id="{5820EEA2-E215-449D-A94F-49DAAB103DE6}"/>
+              </a:ext>
+            </a:extLst>
+          </p:cNvPr>
+          <p:cNvSpPr>
+            <a:spLocks noGrp="1"/>
+          </p:cNvSpPr>
+          <p:nvPr>
+            <p:ph type="title"/>
+          </p:nvPr>
+        </p:nvSpPr>
+        <p:spPr/>
+        <p:txBody>
+          <a:bodyPr/>
+          <a:lstStyle/>
+          <a:p>
+            <a:r>
+              <a:rPr lang="en-US" dirty="0"/>
+              <a:t>Yes, We Can POST JSON!</a:t>
+            </a:r>
+          </a:p>
+        </p:txBody>
+      </p:sp>
+      <p:sp>
+        <p:nvSpPr>
+          <p:cNvPr id="3" name="Content Placeholder 2">
+            <a:extLst>
+              <a:ext uri="{FF2B5EF4-FFF2-40B4-BE49-F238E27FC236}">
+                <a16:creationId xmlns:a16="http://schemas.microsoft.com/office/drawing/2014/main" id="{16ABDE5E-70CE-4705-8801-88C6091617C0}"/>
+              </a:ext>
+            </a:extLst>
+          </p:cNvPr>
+          <p:cNvSpPr>
+            <a:spLocks noGrp="1"/>
+          </p:cNvSpPr>
+          <p:nvPr>
+            <p:ph idx="1"/>
+          </p:nvPr>
+        </p:nvSpPr>
+        <p:spPr/>
+        <p:txBody>
+          <a:bodyPr/>
+          <a:lstStyle/>
+          <a:p>
+            <a:r>
+              <a:rPr lang="en-US" dirty="0"/>
+              <a:t>It’s a matter of setting the right headers to the right values.</a:t>
+            </a:r>
+          </a:p>
+          <a:p>
+            <a:r>
+              <a:rPr lang="en-US" dirty="0"/>
+              <a:t>Content-Type: application/json</a:t>
+            </a:r>
+          </a:p>
+          <a:p>
+            <a:r>
+              <a:rPr lang="en-US" dirty="0"/>
+              <a:t>Good news: Postman has a dropdown to make this easy.</a:t>
+            </a:r>
+          </a:p>
+        </p:txBody>
+      </p:sp>
+    </p:spTree>
+    <p:extLst>
+      <p:ext uri="{BB962C8B-B14F-4D97-AF65-F5344CB8AC3E}">
+        <p14:creationId xmlns:p14="http://schemas.microsoft.com/office/powerpoint/2010/main" val="3692677084"/>
+      </p:ext>
+    </p:extLst>
+  </p:cSld>
+  <p:clrMapOvr>
+    <a:masterClrMapping/>
+  </p:clrMapOvr>
+</p:sld>
+</file>
+
 <file path=ppt/slides/slide28.xml><?xml version="1.0" encoding="utf-8"?>
 <p:sld xmlns:a="http://schemas.openxmlformats.org/drawingml/2006/main" xmlns:r="http://schemas.openxmlformats.org/officeDocument/2006/relationships" xmlns:p="http://schemas.openxmlformats.org/presentationml/2006/main">
   <p:cSld>
@@ -6037,7 +6078,7 @@
           <p:cNvPr id="2" name="Title 1">
             <a:extLst>
               <a:ext uri="{FF2B5EF4-FFF2-40B4-BE49-F238E27FC236}">
-                <a16:creationId xmlns:a16="http://schemas.microsoft.com/office/drawing/2014/main" id="{5820EEA2-E215-449D-A94F-49DAAB103DE6}"/>
+                <a16:creationId xmlns:a16="http://schemas.microsoft.com/office/drawing/2014/main" id="{EEEDFF9E-FFA9-441B-B38D-5FA6596FE49D}"/>
               </a:ext>
             </a:extLst>
           </p:cNvPr>
@@ -6055,7 +6096,7 @@
           <a:p>
             <a:r>
               <a:rPr lang="en-US" dirty="0"/>
-              <a:t>Yes, We Can POST JSON!</a:t>
+              <a:t>What Should We POST?</a:t>
             </a:r>
           </a:p>
         </p:txBody>
@@ -6065,7 +6106,7 @@
           <p:cNvPr id="3" name="Content Placeholder 2">
             <a:extLst>
               <a:ext uri="{FF2B5EF4-FFF2-40B4-BE49-F238E27FC236}">
-                <a16:creationId xmlns:a16="http://schemas.microsoft.com/office/drawing/2014/main" id="{16ABDE5E-70CE-4705-8801-88C6091617C0}"/>
+                <a16:creationId xmlns:a16="http://schemas.microsoft.com/office/drawing/2014/main" id="{3CBE77EE-7748-4191-B3E0-8B83AD2927A2}"/>
               </a:ext>
             </a:extLst>
           </p:cNvPr>
@@ -6083,19 +6124,34 @@
           <a:p>
             <a:r>
               <a:rPr lang="en-US" dirty="0"/>
-              <a:t>It’s a matter of setting the right headers to the right values.</a:t>
-            </a:r>
-          </a:p>
-          <a:p>
-            <a:r>
-              <a:rPr lang="en-US" dirty="0"/>
-              <a:t>Content-Type: application/json</a:t>
-            </a:r>
-          </a:p>
-          <a:p>
-            <a:r>
-              <a:rPr lang="en-US" dirty="0"/>
-              <a:t>Good news: Postman has a dropdown to make this easy.</a:t>
+              <a:t>Any kind of data that changes the state of the server.</a:t>
+            </a:r>
+          </a:p>
+          <a:p>
+            <a:r>
+              <a:rPr lang="en-US" dirty="0"/>
+              <a:t>This could be many, many different things.</a:t>
+            </a:r>
+          </a:p>
+          <a:p>
+            <a:pPr lvl="1"/>
+            <a:r>
+              <a:rPr lang="en-US" dirty="0"/>
+              <a:t>A user registers for a website (name and password stored to database).</a:t>
+            </a:r>
+          </a:p>
+          <a:p>
+            <a:pPr lvl="1"/>
+            <a:r>
+              <a:rPr lang="en-US" dirty="0"/>
+              <a:t>A user updates their password (password updated in the database).</a:t>
+            </a:r>
+          </a:p>
+          <a:p>
+            <a:pPr lvl="1"/>
+            <a:r>
+              <a:rPr lang="en-US" dirty="0"/>
+              <a:t>An new TODO item is added to a TODO list (new item appended to the end).</a:t>
             </a:r>
           </a:p>
         </p:txBody>
@@ -6103,7 +6159,120 @@
     </p:spTree>
     <p:extLst>
       <p:ext uri="{BB962C8B-B14F-4D97-AF65-F5344CB8AC3E}">
-        <p14:creationId xmlns:p14="http://schemas.microsoft.com/office/powerpoint/2010/main" val="3692677084"/>
+        <p14:creationId xmlns:p14="http://schemas.microsoft.com/office/powerpoint/2010/main" val="1003226856"/>
+      </p:ext>
+    </p:extLst>
+  </p:cSld>
+  <p:clrMapOvr>
+    <a:masterClrMapping/>
+  </p:clrMapOvr>
+</p:sld>
+</file>
+
+<file path=ppt/slides/slide29.xml><?xml version="1.0" encoding="utf-8"?>
+<p:sld xmlns:a="http://schemas.openxmlformats.org/drawingml/2006/main" xmlns:r="http://schemas.openxmlformats.org/officeDocument/2006/relationships" xmlns:p="http://schemas.openxmlformats.org/presentationml/2006/main">
+  <p:cSld>
+    <p:spTree>
+      <p:nvGrpSpPr>
+        <p:cNvPr id="1" name=""/>
+        <p:cNvGrpSpPr/>
+        <p:nvPr/>
+      </p:nvGrpSpPr>
+      <p:grpSpPr>
+        <a:xfrm>
+          <a:off x="0" y="0"/>
+          <a:ext cx="0" cy="0"/>
+          <a:chOff x="0" y="0"/>
+          <a:chExt cx="0" cy="0"/>
+        </a:xfrm>
+      </p:grpSpPr>
+      <p:sp>
+        <p:nvSpPr>
+          <p:cNvPr id="2" name="Title 1">
+            <a:extLst>
+              <a:ext uri="{FF2B5EF4-FFF2-40B4-BE49-F238E27FC236}">
+                <a16:creationId xmlns:a16="http://schemas.microsoft.com/office/drawing/2014/main" id="{A92BF371-D7C2-43DB-876D-BC4776B162B8}"/>
+              </a:ext>
+            </a:extLst>
+          </p:cNvPr>
+          <p:cNvSpPr>
+            <a:spLocks noGrp="1"/>
+          </p:cNvSpPr>
+          <p:nvPr>
+            <p:ph type="title"/>
+          </p:nvPr>
+        </p:nvSpPr>
+        <p:spPr/>
+        <p:txBody>
+          <a:bodyPr/>
+          <a:lstStyle/>
+          <a:p>
+            <a:r>
+              <a:rPr lang="en-US" dirty="0"/>
+              <a:t>Considerations</a:t>
+            </a:r>
+          </a:p>
+        </p:txBody>
+      </p:sp>
+      <p:sp>
+        <p:nvSpPr>
+          <p:cNvPr id="3" name="Content Placeholder 2">
+            <a:extLst>
+              <a:ext uri="{FF2B5EF4-FFF2-40B4-BE49-F238E27FC236}">
+                <a16:creationId xmlns:a16="http://schemas.microsoft.com/office/drawing/2014/main" id="{2EE3587F-73B9-43FA-B9E0-9876D7F2333C}"/>
+              </a:ext>
+            </a:extLst>
+          </p:cNvPr>
+          <p:cNvSpPr>
+            <a:spLocks noGrp="1"/>
+          </p:cNvSpPr>
+          <p:nvPr>
+            <p:ph idx="1"/>
+          </p:nvPr>
+        </p:nvSpPr>
+        <p:spPr/>
+        <p:txBody>
+          <a:bodyPr/>
+          <a:lstStyle/>
+          <a:p>
+            <a:r>
+              <a:rPr lang="en-US" dirty="0"/>
+              <a:t>POST data often includes more than one field, and they are often bundled together.</a:t>
+            </a:r>
+          </a:p>
+          <a:p>
+            <a:pPr lvl="1"/>
+            <a:r>
+              <a:rPr lang="en-US" dirty="0"/>
+              <a:t>A login includes a “username” and “password” in one package.</a:t>
+            </a:r>
+          </a:p>
+          <a:p>
+            <a:r>
+              <a:rPr lang="en-US" dirty="0"/>
+              <a:t>Fields often need to be validated.</a:t>
+            </a:r>
+          </a:p>
+          <a:p>
+            <a:pPr lvl="1"/>
+            <a:r>
+              <a:rPr lang="en-US" dirty="0"/>
+              <a:t>Username is required, but first and last name are not.</a:t>
+            </a:r>
+          </a:p>
+          <a:p>
+            <a:pPr lvl="1"/>
+            <a:r>
+              <a:rPr lang="en-US" dirty="0"/>
+              <a:t>You expect a date in a particular format.</a:t>
+            </a:r>
+          </a:p>
+        </p:txBody>
+      </p:sp>
+    </p:spTree>
+    <p:extLst>
+      <p:ext uri="{BB962C8B-B14F-4D97-AF65-F5344CB8AC3E}">
+        <p14:creationId xmlns:p14="http://schemas.microsoft.com/office/powerpoint/2010/main" val="3333799624"/>
       </p:ext>
     </p:extLst>
   </p:cSld>
@@ -6284,6 +6453,851 @@
     <p:extLst>
       <p:ext uri="{BB962C8B-B14F-4D97-AF65-F5344CB8AC3E}">
         <p14:creationId xmlns:p14="http://schemas.microsoft.com/office/powerpoint/2010/main" val="400980235"/>
+      </p:ext>
+    </p:extLst>
+  </p:cSld>
+  <p:clrMapOvr>
+    <a:masterClrMapping/>
+  </p:clrMapOvr>
+</p:sld>
+</file>
+
+<file path=ppt/slides/slide30.xml><?xml version="1.0" encoding="utf-8"?>
+<p:sld xmlns:a="http://schemas.openxmlformats.org/drawingml/2006/main" xmlns:r="http://schemas.openxmlformats.org/officeDocument/2006/relationships" xmlns:p="http://schemas.openxmlformats.org/presentationml/2006/main">
+  <p:cSld>
+    <p:spTree>
+      <p:nvGrpSpPr>
+        <p:cNvPr id="1" name=""/>
+        <p:cNvGrpSpPr/>
+        <p:nvPr/>
+      </p:nvGrpSpPr>
+      <p:grpSpPr>
+        <a:xfrm>
+          <a:off x="0" y="0"/>
+          <a:ext cx="0" cy="0"/>
+          <a:chOff x="0" y="0"/>
+          <a:chExt cx="0" cy="0"/>
+        </a:xfrm>
+      </p:grpSpPr>
+      <p:sp>
+        <p:nvSpPr>
+          <p:cNvPr id="2" name="Title 1">
+            <a:extLst>
+              <a:ext uri="{FF2B5EF4-FFF2-40B4-BE49-F238E27FC236}">
+                <a16:creationId xmlns:a16="http://schemas.microsoft.com/office/drawing/2014/main" id="{42EAF3E5-A60A-4045-81A1-06B04AB73184}"/>
+              </a:ext>
+            </a:extLst>
+          </p:cNvPr>
+          <p:cNvSpPr>
+            <a:spLocks noGrp="1"/>
+          </p:cNvSpPr>
+          <p:nvPr>
+            <p:ph type="title"/>
+          </p:nvPr>
+        </p:nvSpPr>
+        <p:spPr>
+          <a:xfrm>
+            <a:off x="838200" y="2766218"/>
+            <a:ext cx="10515600" cy="1325563"/>
+          </a:xfrm>
+        </p:spPr>
+        <p:txBody>
+          <a:bodyPr>
+            <a:normAutofit fontScale="90000"/>
+          </a:bodyPr>
+          <a:lstStyle/>
+          <a:p>
+            <a:pPr algn="ctr"/>
+            <a:r>
+              <a:rPr lang="en-US" dirty="0"/>
+              <a:t>Let’s start by collecting data into some kind of bundle with a Java method and @</a:t>
+            </a:r>
+            <a:r>
+              <a:rPr lang="en-US" dirty="0" err="1"/>
+              <a:t>PostMapping</a:t>
+            </a:r>
+            <a:r>
+              <a:rPr lang="en-US" dirty="0"/>
+              <a:t>.</a:t>
+            </a:r>
+          </a:p>
+        </p:txBody>
+      </p:sp>
+    </p:spTree>
+    <p:extLst>
+      <p:ext uri="{BB962C8B-B14F-4D97-AF65-F5344CB8AC3E}">
+        <p14:creationId xmlns:p14="http://schemas.microsoft.com/office/powerpoint/2010/main" val="717360624"/>
+      </p:ext>
+    </p:extLst>
+  </p:cSld>
+  <p:clrMapOvr>
+    <a:masterClrMapping/>
+  </p:clrMapOvr>
+</p:sld>
+</file>
+
+<file path=ppt/slides/slide31.xml><?xml version="1.0" encoding="utf-8"?>
+<p:sld xmlns:a="http://schemas.openxmlformats.org/drawingml/2006/main" xmlns:r="http://schemas.openxmlformats.org/officeDocument/2006/relationships" xmlns:p="http://schemas.openxmlformats.org/presentationml/2006/main">
+  <p:cSld>
+    <p:spTree>
+      <p:nvGrpSpPr>
+        <p:cNvPr id="1" name=""/>
+        <p:cNvGrpSpPr/>
+        <p:nvPr/>
+      </p:nvGrpSpPr>
+      <p:grpSpPr>
+        <a:xfrm>
+          <a:off x="0" y="0"/>
+          <a:ext cx="0" cy="0"/>
+          <a:chOff x="0" y="0"/>
+          <a:chExt cx="0" cy="0"/>
+        </a:xfrm>
+      </p:grpSpPr>
+      <p:sp>
+        <p:nvSpPr>
+          <p:cNvPr id="2" name="Title 1">
+            <a:extLst>
+              <a:ext uri="{FF2B5EF4-FFF2-40B4-BE49-F238E27FC236}">
+                <a16:creationId xmlns:a16="http://schemas.microsoft.com/office/drawing/2014/main" id="{F8DA2ED0-27B5-4531-BB7F-B087500F21C0}"/>
+              </a:ext>
+            </a:extLst>
+          </p:cNvPr>
+          <p:cNvSpPr>
+            <a:spLocks noGrp="1"/>
+          </p:cNvSpPr>
+          <p:nvPr>
+            <p:ph type="title"/>
+          </p:nvPr>
+        </p:nvSpPr>
+        <p:spPr/>
+        <p:txBody>
+          <a:bodyPr/>
+          <a:lstStyle/>
+          <a:p>
+            <a:r>
+              <a:rPr lang="en-US" dirty="0"/>
+              <a:t>Critical Parts</a:t>
+            </a:r>
+          </a:p>
+        </p:txBody>
+      </p:sp>
+      <p:sp>
+        <p:nvSpPr>
+          <p:cNvPr id="3" name="Content Placeholder 2">
+            <a:extLst>
+              <a:ext uri="{FF2B5EF4-FFF2-40B4-BE49-F238E27FC236}">
+                <a16:creationId xmlns:a16="http://schemas.microsoft.com/office/drawing/2014/main" id="{4169EFCC-7B8E-4175-A596-149B550CDC20}"/>
+              </a:ext>
+            </a:extLst>
+          </p:cNvPr>
+          <p:cNvSpPr>
+            <a:spLocks noGrp="1"/>
+          </p:cNvSpPr>
+          <p:nvPr>
+            <p:ph idx="1"/>
+          </p:nvPr>
+        </p:nvSpPr>
+        <p:spPr/>
+        <p:txBody>
+          <a:bodyPr/>
+          <a:lstStyle/>
+          <a:p>
+            <a:r>
+              <a:rPr lang="en-US" dirty="0"/>
+              <a:t>@</a:t>
+            </a:r>
+            <a:r>
+              <a:rPr lang="en-US" dirty="0" err="1"/>
+              <a:t>PostMapping</a:t>
+            </a:r>
+            <a:r>
+              <a:rPr lang="en-US" dirty="0"/>
+              <a:t> annotation on the method</a:t>
+            </a:r>
+          </a:p>
+          <a:p>
+            <a:r>
+              <a:rPr lang="en-US" dirty="0"/>
+              <a:t>Return type</a:t>
+            </a:r>
+          </a:p>
+          <a:p>
+            <a:pPr lvl="1"/>
+            <a:r>
+              <a:rPr lang="en-US" dirty="0" err="1"/>
+              <a:t>ResponseEntity</a:t>
+            </a:r>
+            <a:r>
+              <a:rPr lang="en-US" dirty="0"/>
+              <a:t>&lt;&gt; lets you return an arbitrary object paired with a response code.</a:t>
+            </a:r>
+          </a:p>
+          <a:p>
+            <a:r>
+              <a:rPr lang="en-US" dirty="0"/>
+              <a:t>A method argument with the container type of your choosing (custom class, map, etc.) annotated with…</a:t>
+            </a:r>
+          </a:p>
+          <a:p>
+            <a:r>
+              <a:rPr lang="en-US" dirty="0"/>
+              <a:t>@</a:t>
+            </a:r>
+            <a:r>
+              <a:rPr lang="en-US" dirty="0" err="1"/>
+              <a:t>RequestBody</a:t>
+            </a:r>
+            <a:endParaRPr lang="en-US" dirty="0"/>
+          </a:p>
+          <a:p>
+            <a:pPr lvl="1"/>
+            <a:r>
+              <a:rPr lang="en-US" dirty="0"/>
+              <a:t>Java Doc: Annotation indicating a method parameter should be bound to the body of the web request.</a:t>
+            </a:r>
+          </a:p>
+          <a:p>
+            <a:r>
+              <a:rPr lang="en-US" dirty="0"/>
+              <a:t>@Valid if you want the data to be validated.</a:t>
+            </a:r>
+          </a:p>
+          <a:p>
+            <a:endParaRPr lang="en-US" dirty="0"/>
+          </a:p>
+        </p:txBody>
+      </p:sp>
+    </p:spTree>
+    <p:extLst>
+      <p:ext uri="{BB962C8B-B14F-4D97-AF65-F5344CB8AC3E}">
+        <p14:creationId xmlns:p14="http://schemas.microsoft.com/office/powerpoint/2010/main" val="1176153546"/>
+      </p:ext>
+    </p:extLst>
+  </p:cSld>
+  <p:clrMapOvr>
+    <a:masterClrMapping/>
+  </p:clrMapOvr>
+</p:sld>
+</file>
+
+<file path=ppt/slides/slide32.xml><?xml version="1.0" encoding="utf-8"?>
+<p:sld xmlns:a="http://schemas.openxmlformats.org/drawingml/2006/main" xmlns:r="http://schemas.openxmlformats.org/officeDocument/2006/relationships" xmlns:p="http://schemas.openxmlformats.org/presentationml/2006/main">
+  <p:cSld>
+    <p:spTree>
+      <p:nvGrpSpPr>
+        <p:cNvPr id="1" name=""/>
+        <p:cNvGrpSpPr/>
+        <p:nvPr/>
+      </p:nvGrpSpPr>
+      <p:grpSpPr>
+        <a:xfrm>
+          <a:off x="0" y="0"/>
+          <a:ext cx="0" cy="0"/>
+          <a:chOff x="0" y="0"/>
+          <a:chExt cx="0" cy="0"/>
+        </a:xfrm>
+      </p:grpSpPr>
+      <p:sp>
+        <p:nvSpPr>
+          <p:cNvPr id="2" name="Title 1">
+            <a:extLst>
+              <a:ext uri="{FF2B5EF4-FFF2-40B4-BE49-F238E27FC236}">
+                <a16:creationId xmlns:a16="http://schemas.microsoft.com/office/drawing/2014/main" id="{99659B1F-22D1-4BDD-BFA1-20C675E502AE}"/>
+              </a:ext>
+            </a:extLst>
+          </p:cNvPr>
+          <p:cNvSpPr>
+            <a:spLocks noGrp="1"/>
+          </p:cNvSpPr>
+          <p:nvPr>
+            <p:ph type="title"/>
+          </p:nvPr>
+        </p:nvSpPr>
+        <p:spPr/>
+        <p:txBody>
+          <a:bodyPr/>
+          <a:lstStyle/>
+          <a:p>
+            <a:r>
+              <a:rPr lang="en-US" dirty="0"/>
+              <a:t>Map&lt;String, Object&gt;</a:t>
+            </a:r>
+          </a:p>
+        </p:txBody>
+      </p:sp>
+      <p:sp>
+        <p:nvSpPr>
+          <p:cNvPr id="3" name="Content Placeholder 2">
+            <a:extLst>
+              <a:ext uri="{FF2B5EF4-FFF2-40B4-BE49-F238E27FC236}">
+                <a16:creationId xmlns:a16="http://schemas.microsoft.com/office/drawing/2014/main" id="{7221F8E4-7776-472C-BE4B-B8F48AD1D368}"/>
+              </a:ext>
+            </a:extLst>
+          </p:cNvPr>
+          <p:cNvSpPr>
+            <a:spLocks noGrp="1"/>
+          </p:cNvSpPr>
+          <p:nvPr>
+            <p:ph idx="1"/>
+          </p:nvPr>
+        </p:nvSpPr>
+        <p:spPr/>
+        <p:txBody>
+          <a:bodyPr/>
+          <a:lstStyle/>
+          <a:p>
+            <a:r>
+              <a:rPr lang="en-US" dirty="0"/>
+              <a:t>No planning necessary, perhaps useful for rapid prototyping.</a:t>
+            </a:r>
+          </a:p>
+          <a:p>
+            <a:r>
+              <a:rPr lang="en-US" dirty="0"/>
+              <a:t>It’s flexible, but not very customizable.</a:t>
+            </a:r>
+          </a:p>
+        </p:txBody>
+      </p:sp>
+    </p:spTree>
+    <p:extLst>
+      <p:ext uri="{BB962C8B-B14F-4D97-AF65-F5344CB8AC3E}">
+        <p14:creationId xmlns:p14="http://schemas.microsoft.com/office/powerpoint/2010/main" val="4179203065"/>
+      </p:ext>
+    </p:extLst>
+  </p:cSld>
+  <p:clrMapOvr>
+    <a:masterClrMapping/>
+  </p:clrMapOvr>
+</p:sld>
+</file>
+
+<file path=ppt/slides/slide33.xml><?xml version="1.0" encoding="utf-8"?>
+<p:sld xmlns:a="http://schemas.openxmlformats.org/drawingml/2006/main" xmlns:r="http://schemas.openxmlformats.org/officeDocument/2006/relationships" xmlns:p="http://schemas.openxmlformats.org/presentationml/2006/main">
+  <p:cSld>
+    <p:spTree>
+      <p:nvGrpSpPr>
+        <p:cNvPr id="1" name=""/>
+        <p:cNvGrpSpPr/>
+        <p:nvPr/>
+      </p:nvGrpSpPr>
+      <p:grpSpPr>
+        <a:xfrm>
+          <a:off x="0" y="0"/>
+          <a:ext cx="0" cy="0"/>
+          <a:chOff x="0" y="0"/>
+          <a:chExt cx="0" cy="0"/>
+        </a:xfrm>
+      </p:grpSpPr>
+      <p:sp>
+        <p:nvSpPr>
+          <p:cNvPr id="2" name="Title 1">
+            <a:extLst>
+              <a:ext uri="{FF2B5EF4-FFF2-40B4-BE49-F238E27FC236}">
+                <a16:creationId xmlns:a16="http://schemas.microsoft.com/office/drawing/2014/main" id="{AB5AD0F3-72E5-411B-828B-320CA0D8D576}"/>
+              </a:ext>
+            </a:extLst>
+          </p:cNvPr>
+          <p:cNvSpPr>
+            <a:spLocks noGrp="1"/>
+          </p:cNvSpPr>
+          <p:nvPr>
+            <p:ph type="title"/>
+          </p:nvPr>
+        </p:nvSpPr>
+        <p:spPr/>
+        <p:txBody>
+          <a:bodyPr/>
+          <a:lstStyle/>
+          <a:p>
+            <a:r>
+              <a:rPr lang="en-US" dirty="0"/>
+              <a:t>Java Class</a:t>
+            </a:r>
+          </a:p>
+        </p:txBody>
+      </p:sp>
+      <p:sp>
+        <p:nvSpPr>
+          <p:cNvPr id="3" name="Content Placeholder 2">
+            <a:extLst>
+              <a:ext uri="{FF2B5EF4-FFF2-40B4-BE49-F238E27FC236}">
+                <a16:creationId xmlns:a16="http://schemas.microsoft.com/office/drawing/2014/main" id="{84DE88AE-6DA6-4B09-8ED9-9C96C71D95ED}"/>
+              </a:ext>
+            </a:extLst>
+          </p:cNvPr>
+          <p:cNvSpPr>
+            <a:spLocks noGrp="1"/>
+          </p:cNvSpPr>
+          <p:nvPr>
+            <p:ph idx="1"/>
+          </p:nvPr>
+        </p:nvSpPr>
+        <p:spPr/>
+        <p:txBody>
+          <a:bodyPr/>
+          <a:lstStyle/>
+          <a:p>
+            <a:r>
+              <a:rPr lang="en-US" dirty="0"/>
+              <a:t>Methods can be added to include useful functionality.</a:t>
+            </a:r>
+          </a:p>
+          <a:p>
+            <a:r>
+              <a:rPr lang="en-US" dirty="0"/>
+              <a:t>Class, fields, and methods can be annotated to control validation.</a:t>
+            </a:r>
+          </a:p>
+          <a:p>
+            <a:r>
+              <a:rPr lang="en-US" dirty="0"/>
+              <a:t>Better solution in the long run.</a:t>
+            </a:r>
+          </a:p>
+        </p:txBody>
+      </p:sp>
+    </p:spTree>
+    <p:extLst>
+      <p:ext uri="{BB962C8B-B14F-4D97-AF65-F5344CB8AC3E}">
+        <p14:creationId xmlns:p14="http://schemas.microsoft.com/office/powerpoint/2010/main" val="4292086216"/>
+      </p:ext>
+    </p:extLst>
+  </p:cSld>
+  <p:clrMapOvr>
+    <a:masterClrMapping/>
+  </p:clrMapOvr>
+</p:sld>
+</file>
+
+<file path=ppt/slides/slide34.xml><?xml version="1.0" encoding="utf-8"?>
+<p:sld xmlns:a="http://schemas.openxmlformats.org/drawingml/2006/main" xmlns:r="http://schemas.openxmlformats.org/officeDocument/2006/relationships" xmlns:p="http://schemas.openxmlformats.org/presentationml/2006/main">
+  <p:cSld>
+    <p:spTree>
+      <p:nvGrpSpPr>
+        <p:cNvPr id="1" name=""/>
+        <p:cNvGrpSpPr/>
+        <p:nvPr/>
+      </p:nvGrpSpPr>
+      <p:grpSpPr>
+        <a:xfrm>
+          <a:off x="0" y="0"/>
+          <a:ext cx="0" cy="0"/>
+          <a:chOff x="0" y="0"/>
+          <a:chExt cx="0" cy="0"/>
+        </a:xfrm>
+      </p:grpSpPr>
+      <p:sp>
+        <p:nvSpPr>
+          <p:cNvPr id="2" name="Title 1">
+            <a:extLst>
+              <a:ext uri="{FF2B5EF4-FFF2-40B4-BE49-F238E27FC236}">
+                <a16:creationId xmlns:a16="http://schemas.microsoft.com/office/drawing/2014/main" id="{80D9199A-3CEF-400A-A84C-72CA114D0020}"/>
+              </a:ext>
+            </a:extLst>
+          </p:cNvPr>
+          <p:cNvSpPr>
+            <a:spLocks noGrp="1"/>
+          </p:cNvSpPr>
+          <p:nvPr>
+            <p:ph type="title"/>
+          </p:nvPr>
+        </p:nvSpPr>
+        <p:spPr/>
+        <p:txBody>
+          <a:bodyPr/>
+          <a:lstStyle/>
+          <a:p>
+            <a:r>
+              <a:rPr lang="en-US" dirty="0"/>
+              <a:t>Validation</a:t>
+            </a:r>
+          </a:p>
+        </p:txBody>
+      </p:sp>
+      <p:sp>
+        <p:nvSpPr>
+          <p:cNvPr id="3" name="Content Placeholder 2">
+            <a:extLst>
+              <a:ext uri="{FF2B5EF4-FFF2-40B4-BE49-F238E27FC236}">
+                <a16:creationId xmlns:a16="http://schemas.microsoft.com/office/drawing/2014/main" id="{00DD4459-6C3F-47FD-AE31-A6EAA5C0A6F3}"/>
+              </a:ext>
+            </a:extLst>
+          </p:cNvPr>
+          <p:cNvSpPr>
+            <a:spLocks noGrp="1"/>
+          </p:cNvSpPr>
+          <p:nvPr>
+            <p:ph idx="1"/>
+          </p:nvPr>
+        </p:nvSpPr>
+        <p:spPr/>
+        <p:txBody>
+          <a:bodyPr/>
+          <a:lstStyle/>
+          <a:p>
+            <a:r>
+              <a:rPr lang="en-US" dirty="0"/>
+              <a:t>You have 2 main options.</a:t>
+            </a:r>
+          </a:p>
+          <a:p>
+            <a:pPr lvl="1"/>
+            <a:r>
+              <a:rPr lang="en-US" dirty="0"/>
+              <a:t>Implement the Validator interface.</a:t>
+            </a:r>
+          </a:p>
+          <a:p>
+            <a:pPr lvl="1"/>
+            <a:r>
+              <a:rPr lang="en-US" dirty="0"/>
+              <a:t>Annotate your classes with </a:t>
+            </a:r>
+            <a:r>
+              <a:rPr lang="en-US" dirty="0">
+                <a:hlinkClick r:id="rId2"/>
+              </a:rPr>
+              <a:t>JSR-303 annotations</a:t>
+            </a:r>
+            <a:r>
+              <a:rPr lang="en-US" dirty="0"/>
+              <a:t>.</a:t>
+            </a:r>
+          </a:p>
+        </p:txBody>
+      </p:sp>
+    </p:spTree>
+    <p:extLst>
+      <p:ext uri="{BB962C8B-B14F-4D97-AF65-F5344CB8AC3E}">
+        <p14:creationId xmlns:p14="http://schemas.microsoft.com/office/powerpoint/2010/main" val="2659967751"/>
+      </p:ext>
+    </p:extLst>
+  </p:cSld>
+  <p:clrMapOvr>
+    <a:masterClrMapping/>
+  </p:clrMapOvr>
+</p:sld>
+</file>
+
+<file path=ppt/slides/slide35.xml><?xml version="1.0" encoding="utf-8"?>
+<p:sld xmlns:a="http://schemas.openxmlformats.org/drawingml/2006/main" xmlns:r="http://schemas.openxmlformats.org/officeDocument/2006/relationships" xmlns:p="http://schemas.openxmlformats.org/presentationml/2006/main">
+  <p:cSld>
+    <p:spTree>
+      <p:nvGrpSpPr>
+        <p:cNvPr id="1" name=""/>
+        <p:cNvGrpSpPr/>
+        <p:nvPr/>
+      </p:nvGrpSpPr>
+      <p:grpSpPr>
+        <a:xfrm>
+          <a:off x="0" y="0"/>
+          <a:ext cx="0" cy="0"/>
+          <a:chOff x="0" y="0"/>
+          <a:chExt cx="0" cy="0"/>
+        </a:xfrm>
+      </p:grpSpPr>
+      <p:sp>
+        <p:nvSpPr>
+          <p:cNvPr id="2" name="Title 1">
+            <a:extLst>
+              <a:ext uri="{FF2B5EF4-FFF2-40B4-BE49-F238E27FC236}">
+                <a16:creationId xmlns:a16="http://schemas.microsoft.com/office/drawing/2014/main" id="{340C104D-429E-47BC-80D3-43DF7E412B70}"/>
+              </a:ext>
+            </a:extLst>
+          </p:cNvPr>
+          <p:cNvSpPr>
+            <a:spLocks noGrp="1"/>
+          </p:cNvSpPr>
+          <p:nvPr>
+            <p:ph type="title"/>
+          </p:nvPr>
+        </p:nvSpPr>
+        <p:spPr/>
+        <p:txBody>
+          <a:bodyPr/>
+          <a:lstStyle/>
+          <a:p>
+            <a:r>
+              <a:rPr lang="en-US" dirty="0"/>
+              <a:t>Validator Interface</a:t>
+            </a:r>
+          </a:p>
+        </p:txBody>
+      </p:sp>
+      <p:sp>
+        <p:nvSpPr>
+          <p:cNvPr id="3" name="Content Placeholder 2">
+            <a:extLst>
+              <a:ext uri="{FF2B5EF4-FFF2-40B4-BE49-F238E27FC236}">
+                <a16:creationId xmlns:a16="http://schemas.microsoft.com/office/drawing/2014/main" id="{421B1DBF-A574-4490-841B-55D8F83A585B}"/>
+              </a:ext>
+            </a:extLst>
+          </p:cNvPr>
+          <p:cNvSpPr>
+            <a:spLocks noGrp="1"/>
+          </p:cNvSpPr>
+          <p:nvPr>
+            <p:ph idx="1"/>
+          </p:nvPr>
+        </p:nvSpPr>
+        <p:spPr/>
+        <p:txBody>
+          <a:bodyPr/>
+          <a:lstStyle/>
+          <a:p>
+            <a:r>
+              <a:rPr lang="en-US" dirty="0"/>
+              <a:t>Very simple: just implement the interface.</a:t>
+            </a:r>
+          </a:p>
+          <a:p>
+            <a:r>
+              <a:rPr lang="en-US" dirty="0" err="1"/>
+              <a:t>ValidationUtils</a:t>
+            </a:r>
+            <a:r>
+              <a:rPr lang="en-US" dirty="0"/>
+              <a:t> class helps with common validation errors.</a:t>
+            </a:r>
+          </a:p>
+          <a:p>
+            <a:r>
+              <a:rPr lang="en-US" dirty="0"/>
+              <a:t>Register it in your implementation in a controller using @</a:t>
+            </a:r>
+            <a:r>
+              <a:rPr lang="en-US" dirty="0" err="1"/>
+              <a:t>InitBinder</a:t>
+            </a:r>
+            <a:r>
+              <a:rPr lang="en-US" dirty="0"/>
+              <a:t>.</a:t>
+            </a:r>
+          </a:p>
+          <a:p>
+            <a:r>
+              <a:rPr lang="en-US" dirty="0"/>
+              <a:t>Pitfalls</a:t>
+            </a:r>
+          </a:p>
+          <a:p>
+            <a:pPr lvl="1"/>
+            <a:r>
+              <a:rPr lang="en-US" dirty="0"/>
+              <a:t>After you register a validator within a controller, it may validate more than you intended it to.</a:t>
+            </a:r>
+          </a:p>
+          <a:p>
+            <a:pPr lvl="1"/>
+            <a:r>
+              <a:rPr lang="en-US" dirty="0">
+                <a:hlinkClick r:id="rId2"/>
+              </a:rPr>
+              <a:t>The problem can be worked around</a:t>
+            </a:r>
+            <a:r>
+              <a:rPr lang="en-US" dirty="0"/>
+              <a:t>, but it is not well documented.</a:t>
+            </a:r>
+          </a:p>
+        </p:txBody>
+      </p:sp>
+    </p:spTree>
+    <p:extLst>
+      <p:ext uri="{BB962C8B-B14F-4D97-AF65-F5344CB8AC3E}">
+        <p14:creationId xmlns:p14="http://schemas.microsoft.com/office/powerpoint/2010/main" val="4272598279"/>
+      </p:ext>
+    </p:extLst>
+  </p:cSld>
+  <p:clrMapOvr>
+    <a:masterClrMapping/>
+  </p:clrMapOvr>
+</p:sld>
+</file>
+
+<file path=ppt/slides/slide36.xml><?xml version="1.0" encoding="utf-8"?>
+<p:sld xmlns:a="http://schemas.openxmlformats.org/drawingml/2006/main" xmlns:r="http://schemas.openxmlformats.org/officeDocument/2006/relationships" xmlns:p="http://schemas.openxmlformats.org/presentationml/2006/main">
+  <p:cSld>
+    <p:spTree>
+      <p:nvGrpSpPr>
+        <p:cNvPr id="1" name=""/>
+        <p:cNvGrpSpPr/>
+        <p:nvPr/>
+      </p:nvGrpSpPr>
+      <p:grpSpPr>
+        <a:xfrm>
+          <a:off x="0" y="0"/>
+          <a:ext cx="0" cy="0"/>
+          <a:chOff x="0" y="0"/>
+          <a:chExt cx="0" cy="0"/>
+        </a:xfrm>
+      </p:grpSpPr>
+      <p:sp>
+        <p:nvSpPr>
+          <p:cNvPr id="2" name="Title 1">
+            <a:extLst>
+              <a:ext uri="{FF2B5EF4-FFF2-40B4-BE49-F238E27FC236}">
+                <a16:creationId xmlns:a16="http://schemas.microsoft.com/office/drawing/2014/main" id="{EEFF0B08-FB99-4C55-BBB2-9789476DA4D6}"/>
+              </a:ext>
+            </a:extLst>
+          </p:cNvPr>
+          <p:cNvSpPr>
+            <a:spLocks noGrp="1"/>
+          </p:cNvSpPr>
+          <p:nvPr>
+            <p:ph type="title"/>
+          </p:nvPr>
+        </p:nvSpPr>
+        <p:spPr/>
+        <p:txBody>
+          <a:bodyPr/>
+          <a:lstStyle/>
+          <a:p>
+            <a:r>
+              <a:rPr lang="en-US" dirty="0"/>
+              <a:t>JSR-303 Annotations</a:t>
+            </a:r>
+          </a:p>
+        </p:txBody>
+      </p:sp>
+      <p:sp>
+        <p:nvSpPr>
+          <p:cNvPr id="3" name="Content Placeholder 2">
+            <a:extLst>
+              <a:ext uri="{FF2B5EF4-FFF2-40B4-BE49-F238E27FC236}">
+                <a16:creationId xmlns:a16="http://schemas.microsoft.com/office/drawing/2014/main" id="{A75C602F-550C-46E0-A1C1-38F1B1F92D8E}"/>
+              </a:ext>
+            </a:extLst>
+          </p:cNvPr>
+          <p:cNvSpPr>
+            <a:spLocks noGrp="1"/>
+          </p:cNvSpPr>
+          <p:nvPr>
+            <p:ph idx="1"/>
+          </p:nvPr>
+        </p:nvSpPr>
+        <p:spPr/>
+        <p:txBody>
+          <a:bodyPr/>
+          <a:lstStyle/>
+          <a:p>
+            <a:r>
+              <a:rPr lang="en-US" dirty="0"/>
+              <a:t>Spring docs: “JSR-303 standardizes validation constraint declaration and metadata for the Java platform.”</a:t>
+            </a:r>
+          </a:p>
+          <a:p>
+            <a:r>
+              <a:rPr lang="en-US" dirty="0"/>
+              <a:t>Very streamlined</a:t>
+            </a:r>
+          </a:p>
+          <a:p>
+            <a:r>
+              <a:rPr lang="en-US" dirty="0"/>
+              <a:t>Validation rules are readable in the class being validated.</a:t>
+            </a:r>
+          </a:p>
+          <a:p>
+            <a:r>
+              <a:rPr lang="en-US" dirty="0"/>
+              <a:t>Custom constraints can be created fairly easily if you have some familiarity with creating annotations.</a:t>
+            </a:r>
+          </a:p>
+          <a:p>
+            <a:r>
+              <a:rPr lang="en-US" dirty="0"/>
+              <a:t>No need for @</a:t>
+            </a:r>
+            <a:r>
+              <a:rPr lang="en-US" dirty="0" err="1"/>
+              <a:t>InitBinder</a:t>
+            </a:r>
+            <a:r>
+              <a:rPr lang="en-US" dirty="0"/>
+              <a:t> in controller classes.</a:t>
+            </a:r>
+          </a:p>
+        </p:txBody>
+      </p:sp>
+    </p:spTree>
+    <p:extLst>
+      <p:ext uri="{BB962C8B-B14F-4D97-AF65-F5344CB8AC3E}">
+        <p14:creationId xmlns:p14="http://schemas.microsoft.com/office/powerpoint/2010/main" val="3039928537"/>
+      </p:ext>
+    </p:extLst>
+  </p:cSld>
+  <p:clrMapOvr>
+    <a:masterClrMapping/>
+  </p:clrMapOvr>
+</p:sld>
+</file>
+
+<file path=ppt/slides/slide37.xml><?xml version="1.0" encoding="utf-8"?>
+<p:sld xmlns:a="http://schemas.openxmlformats.org/drawingml/2006/main" xmlns:r="http://schemas.openxmlformats.org/officeDocument/2006/relationships" xmlns:p="http://schemas.openxmlformats.org/presentationml/2006/main">
+  <p:cSld>
+    <p:spTree>
+      <p:nvGrpSpPr>
+        <p:cNvPr id="1" name=""/>
+        <p:cNvGrpSpPr/>
+        <p:nvPr/>
+      </p:nvGrpSpPr>
+      <p:grpSpPr>
+        <a:xfrm>
+          <a:off x="0" y="0"/>
+          <a:ext cx="0" cy="0"/>
+          <a:chOff x="0" y="0"/>
+          <a:chExt cx="0" cy="0"/>
+        </a:xfrm>
+      </p:grpSpPr>
+      <p:sp>
+        <p:nvSpPr>
+          <p:cNvPr id="2" name="Title 1">
+            <a:extLst>
+              <a:ext uri="{FF2B5EF4-FFF2-40B4-BE49-F238E27FC236}">
+                <a16:creationId xmlns:a16="http://schemas.microsoft.com/office/drawing/2014/main" id="{42EAF3E5-A60A-4045-81A1-06B04AB73184}"/>
+              </a:ext>
+            </a:extLst>
+          </p:cNvPr>
+          <p:cNvSpPr>
+            <a:spLocks noGrp="1"/>
+          </p:cNvSpPr>
+          <p:nvPr>
+            <p:ph type="title"/>
+          </p:nvPr>
+        </p:nvSpPr>
+        <p:spPr>
+          <a:xfrm>
+            <a:off x="838200" y="1232923"/>
+            <a:ext cx="10515600" cy="4392154"/>
+          </a:xfrm>
+        </p:spPr>
+        <p:txBody>
+          <a:bodyPr>
+            <a:normAutofit/>
+          </a:bodyPr>
+          <a:lstStyle/>
+          <a:p>
+            <a:pPr algn="ctr"/>
+            <a:r>
+              <a:rPr lang="en-US" b="1" dirty="0"/>
+              <a:t>Validation Recommendation</a:t>
+            </a:r>
+            <a:br>
+              <a:rPr lang="en-US" dirty="0"/>
+            </a:br>
+            <a:r>
+              <a:rPr lang="en-US" dirty="0"/>
+              <a:t>Prefer JSR-303 annotations over Validator interface.</a:t>
+            </a:r>
+          </a:p>
+        </p:txBody>
+      </p:sp>
+    </p:spTree>
+    <p:extLst>
+      <p:ext uri="{BB962C8B-B14F-4D97-AF65-F5344CB8AC3E}">
+        <p14:creationId xmlns:p14="http://schemas.microsoft.com/office/powerpoint/2010/main" val="4382478"/>
       </p:ext>
     </p:extLst>
   </p:cSld>
@@ -7812,15 +8826,6 @@
 </file>
 
 <file path=customXml/item1.xml><?xml version="1.0" encoding="utf-8"?>
-<?mso-contentType ?>
-<FormTemplates xmlns="http://schemas.microsoft.com/sharepoint/v3/contenttype/forms">
-  <Display>DocumentLibraryForm</Display>
-  <Edit>DocumentLibraryForm</Edit>
-  <New>DocumentLibraryForm</New>
-</FormTemplates>
-</file>
-
-<file path=customXml/item2.xml><?xml version="1.0" encoding="utf-8"?>
 <ct:contentTypeSchema xmlns:ct="http://schemas.microsoft.com/office/2006/metadata/contentType" xmlns:ma="http://schemas.microsoft.com/office/2006/metadata/properties/metaAttributes" ct:_="" ma:_="" ma:contentTypeName="Document" ma:contentTypeID="0x0101009F0D5DC08ED48D4ABAEA1C30F0E97538" ma:contentTypeVersion="4" ma:contentTypeDescription="Create a new document." ma:contentTypeScope="" ma:versionID="7ab250b74ac1eed330dfc5c9e2da9ddc">
   <xsd:schema xmlns:xsd="http://www.w3.org/2001/XMLSchema" xmlns:xs="http://www.w3.org/2001/XMLSchema" xmlns:p="http://schemas.microsoft.com/office/2006/metadata/properties" xmlns:ns3="756bce03-edf8-48a8-8c33-845f97040487" targetNamespace="http://schemas.microsoft.com/office/2006/metadata/properties" ma:root="true" ma:fieldsID="ae58c0807806750dc056a188b4388fe6" ns3:_="">
     <xsd:import namespace="756bce03-edf8-48a8-8c33-845f97040487"/>
@@ -7966,6 +8971,15 @@
 </ct:contentTypeSchema>
 </file>
 
+<file path=customXml/item2.xml><?xml version="1.0" encoding="utf-8"?>
+<?mso-contentType ?>
+<FormTemplates xmlns="http://schemas.microsoft.com/sharepoint/v3/contenttype/forms">
+  <Display>DocumentLibraryForm</Display>
+  <Edit>DocumentLibraryForm</Edit>
+  <New>DocumentLibraryForm</New>
+</FormTemplates>
+</file>
+
 <file path=customXml/item3.xml><?xml version="1.0" encoding="utf-8"?>
 <p:properties xmlns:p="http://schemas.microsoft.com/office/2006/metadata/properties" xmlns:xsi="http://www.w3.org/2001/XMLSchema-instance" xmlns:pc="http://schemas.microsoft.com/office/infopath/2007/PartnerControls">
   <documentManagement/>
@@ -7973,14 +8987,6 @@
 </file>
 
 <file path=customXml/itemProps1.xml><?xml version="1.0" encoding="utf-8"?>
-<ds:datastoreItem xmlns:ds="http://schemas.openxmlformats.org/officeDocument/2006/customXml" ds:itemID="{3BDF0219-55C7-4A15-928C-4D08467C77EB}">
-  <ds:schemaRefs>
-    <ds:schemaRef ds:uri="http://schemas.microsoft.com/sharepoint/v3/contenttype/forms"/>
-  </ds:schemaRefs>
-</ds:datastoreItem>
-</file>
-
-<file path=customXml/itemProps2.xml><?xml version="1.0" encoding="utf-8"?>
 <ds:datastoreItem xmlns:ds="http://schemas.openxmlformats.org/officeDocument/2006/customXml" ds:itemID="{0E840D0D-6B6D-45C3-A98E-6BBD261FD931}">
   <ds:schemaRefs>
     <ds:schemaRef ds:uri="http://schemas.microsoft.com/office/2006/metadata/contentType"/>
@@ -7994,6 +9000,14 @@
     <ds:schemaRef ds:uri="http://purl.org/dc/elements/1.1/"/>
     <ds:schemaRef ds:uri="http://purl.org/dc/terms/"/>
     <ds:schemaRef ds:uri="http://schemas.microsoft.com/internal/obd"/>
+  </ds:schemaRefs>
+</ds:datastoreItem>
+</file>
+
+<file path=customXml/itemProps2.xml><?xml version="1.0" encoding="utf-8"?>
+<ds:datastoreItem xmlns:ds="http://schemas.openxmlformats.org/officeDocument/2006/customXml" ds:itemID="{3BDF0219-55C7-4A15-928C-4D08467C77EB}">
+  <ds:schemaRefs>
+    <ds:schemaRef ds:uri="http://schemas.microsoft.com/sharepoint/v3/contenttype/forms"/>
   </ds:schemaRefs>
 </ds:datastoreItem>
 </file>

</xml_diff>

<commit_message>
Updated presentation and homepage.
</commit_message>
<xml_diff>
--- a/files/spring-boot-basics.pptx
+++ b/files/spring-boot-basics.pptx
@@ -42,6 +42,14 @@
     <p:sldId id="289" r:id="rId39"/>
     <p:sldId id="290" r:id="rId40"/>
     <p:sldId id="292" r:id="rId41"/>
+    <p:sldId id="293" r:id="rId42"/>
+    <p:sldId id="294" r:id="rId43"/>
+    <p:sldId id="295" r:id="rId44"/>
+    <p:sldId id="296" r:id="rId45"/>
+    <p:sldId id="297" r:id="rId46"/>
+    <p:sldId id="298" r:id="rId47"/>
+    <p:sldId id="299" r:id="rId48"/>
+    <p:sldId id="300" r:id="rId49"/>
   </p:sldIdLst>
   <p:sldSz cx="12192000" cy="6858000"/>
   <p:notesSz cx="6858000" cy="9144000"/>
@@ -303,7 +311,7 @@
           <a:p>
             <a:fld id="{E85AC179-74D8-4233-991E-D09988E98AC5}" type="datetimeFigureOut">
               <a:rPr lang="en-US" smtClean="0"/>
-              <a:t>1/22/2020</a:t>
+              <a:t>1/28/2020</a:t>
             </a:fld>
             <a:endParaRPr lang="en-US"/>
           </a:p>
@@ -501,7 +509,7 @@
           <a:p>
             <a:fld id="{E85AC179-74D8-4233-991E-D09988E98AC5}" type="datetimeFigureOut">
               <a:rPr lang="en-US" smtClean="0"/>
-              <a:t>1/22/2020</a:t>
+              <a:t>1/28/2020</a:t>
             </a:fld>
             <a:endParaRPr lang="en-US"/>
           </a:p>
@@ -709,7 +717,7 @@
           <a:p>
             <a:fld id="{E85AC179-74D8-4233-991E-D09988E98AC5}" type="datetimeFigureOut">
               <a:rPr lang="en-US" smtClean="0"/>
-              <a:t>1/22/2020</a:t>
+              <a:t>1/28/2020</a:t>
             </a:fld>
             <a:endParaRPr lang="en-US"/>
           </a:p>
@@ -907,7 +915,7 @@
           <a:p>
             <a:fld id="{E85AC179-74D8-4233-991E-D09988E98AC5}" type="datetimeFigureOut">
               <a:rPr lang="en-US" smtClean="0"/>
-              <a:t>1/22/2020</a:t>
+              <a:t>1/28/2020</a:t>
             </a:fld>
             <a:endParaRPr lang="en-US"/>
           </a:p>
@@ -1182,7 +1190,7 @@
           <a:p>
             <a:fld id="{E85AC179-74D8-4233-991E-D09988E98AC5}" type="datetimeFigureOut">
               <a:rPr lang="en-US" smtClean="0"/>
-              <a:t>1/22/2020</a:t>
+              <a:t>1/28/2020</a:t>
             </a:fld>
             <a:endParaRPr lang="en-US"/>
           </a:p>
@@ -1447,7 +1455,7 @@
           <a:p>
             <a:fld id="{E85AC179-74D8-4233-991E-D09988E98AC5}" type="datetimeFigureOut">
               <a:rPr lang="en-US" smtClean="0"/>
-              <a:t>1/22/2020</a:t>
+              <a:t>1/28/2020</a:t>
             </a:fld>
             <a:endParaRPr lang="en-US"/>
           </a:p>
@@ -1859,7 +1867,7 @@
           <a:p>
             <a:fld id="{E85AC179-74D8-4233-991E-D09988E98AC5}" type="datetimeFigureOut">
               <a:rPr lang="en-US" smtClean="0"/>
-              <a:t>1/22/2020</a:t>
+              <a:t>1/28/2020</a:t>
             </a:fld>
             <a:endParaRPr lang="en-US"/>
           </a:p>
@@ -2000,7 +2008,7 @@
           <a:p>
             <a:fld id="{E85AC179-74D8-4233-991E-D09988E98AC5}" type="datetimeFigureOut">
               <a:rPr lang="en-US" smtClean="0"/>
-              <a:t>1/22/2020</a:t>
+              <a:t>1/28/2020</a:t>
             </a:fld>
             <a:endParaRPr lang="en-US"/>
           </a:p>
@@ -2113,7 +2121,7 @@
           <a:p>
             <a:fld id="{E85AC179-74D8-4233-991E-D09988E98AC5}" type="datetimeFigureOut">
               <a:rPr lang="en-US" smtClean="0"/>
-              <a:t>1/22/2020</a:t>
+              <a:t>1/28/2020</a:t>
             </a:fld>
             <a:endParaRPr lang="en-US"/>
           </a:p>
@@ -2424,7 +2432,7 @@
           <a:p>
             <a:fld id="{E85AC179-74D8-4233-991E-D09988E98AC5}" type="datetimeFigureOut">
               <a:rPr lang="en-US" smtClean="0"/>
-              <a:t>1/22/2020</a:t>
+              <a:t>1/28/2020</a:t>
             </a:fld>
             <a:endParaRPr lang="en-US"/>
           </a:p>
@@ -2712,7 +2720,7 @@
           <a:p>
             <a:fld id="{E85AC179-74D8-4233-991E-D09988E98AC5}" type="datetimeFigureOut">
               <a:rPr lang="en-US" smtClean="0"/>
-              <a:t>1/22/2020</a:t>
+              <a:t>1/28/2020</a:t>
             </a:fld>
             <a:endParaRPr lang="en-US"/>
           </a:p>
@@ -2953,7 +2961,7 @@
           <a:p>
             <a:fld id="{E85AC179-74D8-4233-991E-D09988E98AC5}" type="datetimeFigureOut">
               <a:rPr lang="en-US" smtClean="0"/>
-              <a:t>1/22/2020</a:t>
+              <a:t>1/28/2020</a:t>
             </a:fld>
             <a:endParaRPr lang="en-US"/>
           </a:p>
@@ -7307,6 +7315,204 @@
 </p:sld>
 </file>
 
+<file path=ppt/slides/slide38.xml><?xml version="1.0" encoding="utf-8"?>
+<p:sld xmlns:a="http://schemas.openxmlformats.org/drawingml/2006/main" xmlns:r="http://schemas.openxmlformats.org/officeDocument/2006/relationships" xmlns:p="http://schemas.openxmlformats.org/presentationml/2006/main">
+  <p:cSld>
+    <p:spTree>
+      <p:nvGrpSpPr>
+        <p:cNvPr id="1" name=""/>
+        <p:cNvGrpSpPr/>
+        <p:nvPr/>
+      </p:nvGrpSpPr>
+      <p:grpSpPr>
+        <a:xfrm>
+          <a:off x="0" y="0"/>
+          <a:ext cx="0" cy="0"/>
+          <a:chOff x="0" y="0"/>
+          <a:chExt cx="0" cy="0"/>
+        </a:xfrm>
+      </p:grpSpPr>
+      <p:sp>
+        <p:nvSpPr>
+          <p:cNvPr id="2" name="Title 1">
+            <a:extLst>
+              <a:ext uri="{FF2B5EF4-FFF2-40B4-BE49-F238E27FC236}">
+                <a16:creationId xmlns:a16="http://schemas.microsoft.com/office/drawing/2014/main" id="{42EAF3E5-A60A-4045-81A1-06B04AB73184}"/>
+              </a:ext>
+            </a:extLst>
+          </p:cNvPr>
+          <p:cNvSpPr>
+            <a:spLocks noGrp="1"/>
+          </p:cNvSpPr>
+          <p:nvPr>
+            <p:ph type="title"/>
+          </p:nvPr>
+        </p:nvSpPr>
+        <p:spPr>
+          <a:xfrm>
+            <a:off x="838200" y="2766218"/>
+            <a:ext cx="10515600" cy="1325563"/>
+          </a:xfrm>
+        </p:spPr>
+        <p:txBody>
+          <a:bodyPr>
+            <a:normAutofit/>
+          </a:bodyPr>
+          <a:lstStyle/>
+          <a:p>
+            <a:pPr algn="ctr"/>
+            <a:r>
+              <a:rPr lang="en-US" dirty="0"/>
+              <a:t>Dependency Injection</a:t>
+            </a:r>
+          </a:p>
+        </p:txBody>
+      </p:sp>
+    </p:spTree>
+    <p:extLst>
+      <p:ext uri="{BB962C8B-B14F-4D97-AF65-F5344CB8AC3E}">
+        <p14:creationId xmlns:p14="http://schemas.microsoft.com/office/powerpoint/2010/main" val="1955734718"/>
+      </p:ext>
+    </p:extLst>
+  </p:cSld>
+  <p:clrMapOvr>
+    <a:masterClrMapping/>
+  </p:clrMapOvr>
+</p:sld>
+</file>
+
+<file path=ppt/slides/slide39.xml><?xml version="1.0" encoding="utf-8"?>
+<p:sld xmlns:a="http://schemas.openxmlformats.org/drawingml/2006/main" xmlns:r="http://schemas.openxmlformats.org/officeDocument/2006/relationships" xmlns:p="http://schemas.openxmlformats.org/presentationml/2006/main">
+  <p:cSld>
+    <p:spTree>
+      <p:nvGrpSpPr>
+        <p:cNvPr id="1" name=""/>
+        <p:cNvGrpSpPr/>
+        <p:nvPr/>
+      </p:nvGrpSpPr>
+      <p:grpSpPr>
+        <a:xfrm>
+          <a:off x="0" y="0"/>
+          <a:ext cx="0" cy="0"/>
+          <a:chOff x="0" y="0"/>
+          <a:chExt cx="0" cy="0"/>
+        </a:xfrm>
+      </p:grpSpPr>
+      <p:sp>
+        <p:nvSpPr>
+          <p:cNvPr id="2" name="Title 1">
+            <a:extLst>
+              <a:ext uri="{FF2B5EF4-FFF2-40B4-BE49-F238E27FC236}">
+                <a16:creationId xmlns:a16="http://schemas.microsoft.com/office/drawing/2014/main" id="{1CBDEE3D-BA0D-4300-AB62-0AE594DC5234}"/>
+              </a:ext>
+            </a:extLst>
+          </p:cNvPr>
+          <p:cNvSpPr>
+            <a:spLocks noGrp="1"/>
+          </p:cNvSpPr>
+          <p:nvPr>
+            <p:ph type="title"/>
+          </p:nvPr>
+        </p:nvSpPr>
+        <p:spPr/>
+        <p:txBody>
+          <a:bodyPr/>
+          <a:lstStyle/>
+          <a:p>
+            <a:r>
+              <a:rPr lang="en-US" dirty="0"/>
+              <a:t>What is Dependency Injection</a:t>
+            </a:r>
+          </a:p>
+        </p:txBody>
+      </p:sp>
+      <p:sp>
+        <p:nvSpPr>
+          <p:cNvPr id="3" name="Content Placeholder 2">
+            <a:extLst>
+              <a:ext uri="{FF2B5EF4-FFF2-40B4-BE49-F238E27FC236}">
+                <a16:creationId xmlns:a16="http://schemas.microsoft.com/office/drawing/2014/main" id="{15D3FA34-F304-464D-8AFA-0E5074768C16}"/>
+              </a:ext>
+            </a:extLst>
+          </p:cNvPr>
+          <p:cNvSpPr>
+            <a:spLocks noGrp="1"/>
+          </p:cNvSpPr>
+          <p:nvPr>
+            <p:ph idx="1"/>
+          </p:nvPr>
+        </p:nvSpPr>
+        <p:spPr/>
+        <p:txBody>
+          <a:bodyPr/>
+          <a:lstStyle/>
+          <a:p>
+            <a:r>
+              <a:rPr lang="en-US" dirty="0"/>
+              <a:t>When one class depends on another class to complete its work, dependency injection supplies the dependent class.</a:t>
+            </a:r>
+          </a:p>
+          <a:p>
+            <a:r>
+              <a:rPr lang="en-US" dirty="0"/>
+              <a:t>Encourages code reuse (</a:t>
+            </a:r>
+            <a:r>
+              <a:rPr lang="en-US" dirty="0">
+                <a:hlinkClick r:id="rId2"/>
+              </a:rPr>
+              <a:t>DRY principle</a:t>
+            </a:r>
+            <a:r>
+              <a:rPr lang="en-US" dirty="0"/>
+              <a:t>).</a:t>
+            </a:r>
+          </a:p>
+          <a:p>
+            <a:r>
+              <a:rPr lang="en-US" dirty="0"/>
+              <a:t>A single class can be injected (shared) by many other classes, which can reduce memory usage.</a:t>
+            </a:r>
+          </a:p>
+          <a:p>
+            <a:r>
+              <a:rPr lang="en-US" dirty="0"/>
+              <a:t>Spring has a class called </a:t>
+            </a:r>
+            <a:r>
+              <a:rPr lang="en-US" dirty="0" err="1"/>
+              <a:t>ApplicationContext</a:t>
+            </a:r>
+            <a:r>
+              <a:rPr lang="en-US" dirty="0"/>
+              <a:t> that contains dependencies.</a:t>
+            </a:r>
+          </a:p>
+          <a:p>
+            <a:r>
+              <a:rPr lang="en-US" dirty="0">
+                <a:highlight>
+                  <a:srgbClr val="FFFF00"/>
+                </a:highlight>
+              </a:rPr>
+              <a:t>It’s a giant bag full of tools.</a:t>
+            </a:r>
+          </a:p>
+        </p:txBody>
+      </p:sp>
+    </p:spTree>
+    <p:extLst>
+      <p:ext uri="{BB962C8B-B14F-4D97-AF65-F5344CB8AC3E}">
+        <p14:creationId xmlns:p14="http://schemas.microsoft.com/office/powerpoint/2010/main" val="317717171"/>
+      </p:ext>
+    </p:extLst>
+  </p:cSld>
+  <p:clrMapOvr>
+    <a:masterClrMapping/>
+  </p:clrMapOvr>
+</p:sld>
+</file>
+
 <file path=ppt/slides/slide4.xml><?xml version="1.0" encoding="utf-8"?>
 <p:sld xmlns:a="http://schemas.openxmlformats.org/drawingml/2006/main" xmlns:r="http://schemas.openxmlformats.org/officeDocument/2006/relationships" xmlns:p="http://schemas.openxmlformats.org/presentationml/2006/main">
   <p:cSld>
@@ -7427,6 +7633,727 @@
     <p:extLst>
       <p:ext uri="{BB962C8B-B14F-4D97-AF65-F5344CB8AC3E}">
         <p14:creationId xmlns:p14="http://schemas.microsoft.com/office/powerpoint/2010/main" val="667092401"/>
+      </p:ext>
+    </p:extLst>
+  </p:cSld>
+  <p:clrMapOvr>
+    <a:masterClrMapping/>
+  </p:clrMapOvr>
+</p:sld>
+</file>
+
+<file path=ppt/slides/slide40.xml><?xml version="1.0" encoding="utf-8"?>
+<p:sld xmlns:a="http://schemas.openxmlformats.org/drawingml/2006/main" xmlns:r="http://schemas.openxmlformats.org/officeDocument/2006/relationships" xmlns:p="http://schemas.openxmlformats.org/presentationml/2006/main">
+  <p:cSld>
+    <p:spTree>
+      <p:nvGrpSpPr>
+        <p:cNvPr id="1" name=""/>
+        <p:cNvGrpSpPr/>
+        <p:nvPr/>
+      </p:nvGrpSpPr>
+      <p:grpSpPr>
+        <a:xfrm>
+          <a:off x="0" y="0"/>
+          <a:ext cx="0" cy="0"/>
+          <a:chOff x="0" y="0"/>
+          <a:chExt cx="0" cy="0"/>
+        </a:xfrm>
+      </p:grpSpPr>
+      <p:sp>
+        <p:nvSpPr>
+          <p:cNvPr id="2" name="Title 1">
+            <a:extLst>
+              <a:ext uri="{FF2B5EF4-FFF2-40B4-BE49-F238E27FC236}">
+                <a16:creationId xmlns:a16="http://schemas.microsoft.com/office/drawing/2014/main" id="{CC12EECA-CFBC-4DC2-AEF4-E5A23DD4A206}"/>
+              </a:ext>
+            </a:extLst>
+          </p:cNvPr>
+          <p:cNvSpPr>
+            <a:spLocks noGrp="1"/>
+          </p:cNvSpPr>
+          <p:nvPr>
+            <p:ph type="title"/>
+          </p:nvPr>
+        </p:nvSpPr>
+        <p:spPr/>
+        <p:txBody>
+          <a:bodyPr/>
+          <a:lstStyle/>
+          <a:p>
+            <a:r>
+              <a:rPr lang="en-US" dirty="0"/>
+              <a:t>@Component</a:t>
+            </a:r>
+          </a:p>
+        </p:txBody>
+      </p:sp>
+      <p:sp>
+        <p:nvSpPr>
+          <p:cNvPr id="3" name="Content Placeholder 2">
+            <a:extLst>
+              <a:ext uri="{FF2B5EF4-FFF2-40B4-BE49-F238E27FC236}">
+                <a16:creationId xmlns:a16="http://schemas.microsoft.com/office/drawing/2014/main" id="{0FD646F5-6202-4D11-8E17-D68B32DA9A97}"/>
+              </a:ext>
+            </a:extLst>
+          </p:cNvPr>
+          <p:cNvSpPr>
+            <a:spLocks noGrp="1"/>
+          </p:cNvSpPr>
+          <p:nvPr>
+            <p:ph idx="1"/>
+          </p:nvPr>
+        </p:nvSpPr>
+        <p:spPr/>
+        <p:txBody>
+          <a:bodyPr>
+            <a:normAutofit lnSpcReduction="10000"/>
+          </a:bodyPr>
+          <a:lstStyle/>
+          <a:p>
+            <a:r>
+              <a:rPr lang="en-US" b="1" dirty="0"/>
+              <a:t>Javadoc</a:t>
+            </a:r>
+            <a:r>
+              <a:rPr lang="en-US" dirty="0"/>
+              <a:t>: Indicates that an annotated class is a "component". Such classes are considered as candidates for auto-detection when using annotation-based configuration and </a:t>
+            </a:r>
+            <a:r>
+              <a:rPr lang="en-US" dirty="0" err="1"/>
+              <a:t>classpath</a:t>
+            </a:r>
+            <a:r>
+              <a:rPr lang="en-US" dirty="0"/>
+              <a:t> scanning.</a:t>
+            </a:r>
+          </a:p>
+          <a:p>
+            <a:r>
+              <a:rPr lang="en-US" dirty="0"/>
+              <a:t>Spring will automatically search for and load the annotated class and add it to the </a:t>
+            </a:r>
+            <a:r>
+              <a:rPr lang="en-US" dirty="0" err="1"/>
+              <a:t>ApplicationContext</a:t>
+            </a:r>
+            <a:r>
+              <a:rPr lang="en-US" dirty="0"/>
+              <a:t>.</a:t>
+            </a:r>
+          </a:p>
+          <a:p>
+            <a:r>
+              <a:rPr lang="en-US" dirty="0"/>
+              <a:t>Indicates the annotated class can be use by other classes and automatically injected when used with @</a:t>
+            </a:r>
+            <a:r>
+              <a:rPr lang="en-US" dirty="0" err="1"/>
+              <a:t>Autowired</a:t>
+            </a:r>
+            <a:r>
+              <a:rPr lang="en-US" dirty="0"/>
+              <a:t>.</a:t>
+            </a:r>
+          </a:p>
+          <a:p>
+            <a:r>
+              <a:rPr lang="en-US" dirty="0"/>
+              <a:t>Variations: @Repository, @Service, and more.</a:t>
+            </a:r>
+          </a:p>
+          <a:p>
+            <a:pPr lvl="1"/>
+            <a:r>
+              <a:rPr lang="en-US" dirty="0"/>
+              <a:t>The variations sometimes imply some additional behavior.</a:t>
+            </a:r>
+          </a:p>
+          <a:p>
+            <a:r>
+              <a:rPr lang="en-US" dirty="0">
+                <a:highlight>
+                  <a:srgbClr val="FFFF00"/>
+                </a:highlight>
+              </a:rPr>
+              <a:t>Puts a tool in your tool bag.</a:t>
+            </a:r>
+          </a:p>
+        </p:txBody>
+      </p:sp>
+    </p:spTree>
+    <p:extLst>
+      <p:ext uri="{BB962C8B-B14F-4D97-AF65-F5344CB8AC3E}">
+        <p14:creationId xmlns:p14="http://schemas.microsoft.com/office/powerpoint/2010/main" val="917754334"/>
+      </p:ext>
+    </p:extLst>
+  </p:cSld>
+  <p:clrMapOvr>
+    <a:masterClrMapping/>
+  </p:clrMapOvr>
+</p:sld>
+</file>
+
+<file path=ppt/slides/slide41.xml><?xml version="1.0" encoding="utf-8"?>
+<p:sld xmlns:a="http://schemas.openxmlformats.org/drawingml/2006/main" xmlns:r="http://schemas.openxmlformats.org/officeDocument/2006/relationships" xmlns:p="http://schemas.openxmlformats.org/presentationml/2006/main">
+  <p:cSld>
+    <p:spTree>
+      <p:nvGrpSpPr>
+        <p:cNvPr id="1" name=""/>
+        <p:cNvGrpSpPr/>
+        <p:nvPr/>
+      </p:nvGrpSpPr>
+      <p:grpSpPr>
+        <a:xfrm>
+          <a:off x="0" y="0"/>
+          <a:ext cx="0" cy="0"/>
+          <a:chOff x="0" y="0"/>
+          <a:chExt cx="0" cy="0"/>
+        </a:xfrm>
+      </p:grpSpPr>
+      <p:sp>
+        <p:nvSpPr>
+          <p:cNvPr id="2" name="Title 1">
+            <a:extLst>
+              <a:ext uri="{FF2B5EF4-FFF2-40B4-BE49-F238E27FC236}">
+                <a16:creationId xmlns:a16="http://schemas.microsoft.com/office/drawing/2014/main" id="{7BCF47A8-EBA4-49ED-BF77-BCCE5F8913A6}"/>
+              </a:ext>
+            </a:extLst>
+          </p:cNvPr>
+          <p:cNvSpPr>
+            <a:spLocks noGrp="1"/>
+          </p:cNvSpPr>
+          <p:nvPr>
+            <p:ph type="title"/>
+          </p:nvPr>
+        </p:nvSpPr>
+        <p:spPr/>
+        <p:txBody>
+          <a:bodyPr/>
+          <a:lstStyle/>
+          <a:p>
+            <a:r>
+              <a:rPr lang="en-US" dirty="0"/>
+              <a:t>@</a:t>
+            </a:r>
+            <a:r>
+              <a:rPr lang="en-US" dirty="0" err="1"/>
+              <a:t>Autowired</a:t>
+            </a:r>
+            <a:endParaRPr lang="en-US" dirty="0"/>
+          </a:p>
+        </p:txBody>
+      </p:sp>
+      <p:sp>
+        <p:nvSpPr>
+          <p:cNvPr id="3" name="Content Placeholder 2">
+            <a:extLst>
+              <a:ext uri="{FF2B5EF4-FFF2-40B4-BE49-F238E27FC236}">
+                <a16:creationId xmlns:a16="http://schemas.microsoft.com/office/drawing/2014/main" id="{076275FF-5E6D-4CC1-B1CF-1736729000E1}"/>
+              </a:ext>
+            </a:extLst>
+          </p:cNvPr>
+          <p:cNvSpPr>
+            <a:spLocks noGrp="1"/>
+          </p:cNvSpPr>
+          <p:nvPr>
+            <p:ph idx="1"/>
+          </p:nvPr>
+        </p:nvSpPr>
+        <p:spPr/>
+        <p:txBody>
+          <a:bodyPr/>
+          <a:lstStyle/>
+          <a:p>
+            <a:r>
+              <a:rPr lang="en-US" b="1" dirty="0"/>
+              <a:t>Javadoc: </a:t>
+            </a:r>
+            <a:r>
+              <a:rPr lang="en-US" dirty="0"/>
+              <a:t>Marks a constructor, field, setter method, or config method as to be </a:t>
+            </a:r>
+            <a:r>
+              <a:rPr lang="en-US" dirty="0" err="1"/>
+              <a:t>autowired</a:t>
+            </a:r>
+            <a:r>
+              <a:rPr lang="en-US" dirty="0"/>
+              <a:t> by Spring's dependency injection facilities.</a:t>
+            </a:r>
+            <a:endParaRPr lang="en-US" dirty="0">
+              <a:highlight>
+                <a:srgbClr val="FFFF00"/>
+              </a:highlight>
+            </a:endParaRPr>
+          </a:p>
+          <a:p>
+            <a:r>
+              <a:rPr lang="en-US" dirty="0">
+                <a:highlight>
+                  <a:srgbClr val="FFFF00"/>
+                </a:highlight>
+              </a:rPr>
+              <a:t>Marks a location where you want to use a tool from the tool bag.</a:t>
+            </a:r>
+          </a:p>
+        </p:txBody>
+      </p:sp>
+    </p:spTree>
+    <p:extLst>
+      <p:ext uri="{BB962C8B-B14F-4D97-AF65-F5344CB8AC3E}">
+        <p14:creationId xmlns:p14="http://schemas.microsoft.com/office/powerpoint/2010/main" val="2548517262"/>
+      </p:ext>
+    </p:extLst>
+  </p:cSld>
+  <p:clrMapOvr>
+    <a:masterClrMapping/>
+  </p:clrMapOvr>
+</p:sld>
+</file>
+
+<file path=ppt/slides/slide42.xml><?xml version="1.0" encoding="utf-8"?>
+<p:sld xmlns:a="http://schemas.openxmlformats.org/drawingml/2006/main" xmlns:r="http://schemas.openxmlformats.org/officeDocument/2006/relationships" xmlns:p="http://schemas.openxmlformats.org/presentationml/2006/main">
+  <p:cSld>
+    <p:spTree>
+      <p:nvGrpSpPr>
+        <p:cNvPr id="1" name=""/>
+        <p:cNvGrpSpPr/>
+        <p:nvPr/>
+      </p:nvGrpSpPr>
+      <p:grpSpPr>
+        <a:xfrm>
+          <a:off x="0" y="0"/>
+          <a:ext cx="0" cy="0"/>
+          <a:chOff x="0" y="0"/>
+          <a:chExt cx="0" cy="0"/>
+        </a:xfrm>
+      </p:grpSpPr>
+      <p:sp>
+        <p:nvSpPr>
+          <p:cNvPr id="2" name="Title 1">
+            <a:extLst>
+              <a:ext uri="{FF2B5EF4-FFF2-40B4-BE49-F238E27FC236}">
+                <a16:creationId xmlns:a16="http://schemas.microsoft.com/office/drawing/2014/main" id="{B4BFEFB9-BD51-4105-98DB-0AA2A206D97F}"/>
+              </a:ext>
+            </a:extLst>
+          </p:cNvPr>
+          <p:cNvSpPr>
+            <a:spLocks noGrp="1"/>
+          </p:cNvSpPr>
+          <p:nvPr>
+            <p:ph type="title"/>
+          </p:nvPr>
+        </p:nvSpPr>
+        <p:spPr/>
+        <p:txBody>
+          <a:bodyPr/>
+          <a:lstStyle/>
+          <a:p>
+            <a:r>
+              <a:rPr lang="en-US" dirty="0"/>
+              <a:t>@Configuration</a:t>
+            </a:r>
+          </a:p>
+        </p:txBody>
+      </p:sp>
+      <p:sp>
+        <p:nvSpPr>
+          <p:cNvPr id="3" name="Content Placeholder 2">
+            <a:extLst>
+              <a:ext uri="{FF2B5EF4-FFF2-40B4-BE49-F238E27FC236}">
+                <a16:creationId xmlns:a16="http://schemas.microsoft.com/office/drawing/2014/main" id="{F394F6AC-5A4C-4889-9E33-1C35F2E02C84}"/>
+              </a:ext>
+            </a:extLst>
+          </p:cNvPr>
+          <p:cNvSpPr>
+            <a:spLocks noGrp="1"/>
+          </p:cNvSpPr>
+          <p:nvPr>
+            <p:ph idx="1"/>
+          </p:nvPr>
+        </p:nvSpPr>
+        <p:spPr/>
+        <p:txBody>
+          <a:bodyPr/>
+          <a:lstStyle/>
+          <a:p>
+            <a:r>
+              <a:rPr lang="en-US" b="1" dirty="0"/>
+              <a:t>Javadoc:</a:t>
+            </a:r>
+            <a:r>
+              <a:rPr lang="en-US" dirty="0"/>
+              <a:t> Indicates that a class declares one or more @Bean methods and may be processed by the Spring container to generate bean definitions and service requests for those beans at runtime.</a:t>
+            </a:r>
+          </a:p>
+          <a:p>
+            <a:r>
+              <a:rPr lang="en-US" dirty="0">
+                <a:highlight>
+                  <a:srgbClr val="FFFF00"/>
+                </a:highlight>
+              </a:rPr>
+              <a:t>A class that creates tools and configures tools.</a:t>
+            </a:r>
+          </a:p>
+        </p:txBody>
+      </p:sp>
+    </p:spTree>
+    <p:extLst>
+      <p:ext uri="{BB962C8B-B14F-4D97-AF65-F5344CB8AC3E}">
+        <p14:creationId xmlns:p14="http://schemas.microsoft.com/office/powerpoint/2010/main" val="1895059963"/>
+      </p:ext>
+    </p:extLst>
+  </p:cSld>
+  <p:clrMapOvr>
+    <a:masterClrMapping/>
+  </p:clrMapOvr>
+</p:sld>
+</file>
+
+<file path=ppt/slides/slide43.xml><?xml version="1.0" encoding="utf-8"?>
+<p:sld xmlns:a="http://schemas.openxmlformats.org/drawingml/2006/main" xmlns:r="http://schemas.openxmlformats.org/officeDocument/2006/relationships" xmlns:p="http://schemas.openxmlformats.org/presentationml/2006/main">
+  <p:cSld>
+    <p:spTree>
+      <p:nvGrpSpPr>
+        <p:cNvPr id="1" name=""/>
+        <p:cNvGrpSpPr/>
+        <p:nvPr/>
+      </p:nvGrpSpPr>
+      <p:grpSpPr>
+        <a:xfrm>
+          <a:off x="0" y="0"/>
+          <a:ext cx="0" cy="0"/>
+          <a:chOff x="0" y="0"/>
+          <a:chExt cx="0" cy="0"/>
+        </a:xfrm>
+      </p:grpSpPr>
+      <p:sp>
+        <p:nvSpPr>
+          <p:cNvPr id="2" name="Title 1">
+            <a:extLst>
+              <a:ext uri="{FF2B5EF4-FFF2-40B4-BE49-F238E27FC236}">
+                <a16:creationId xmlns:a16="http://schemas.microsoft.com/office/drawing/2014/main" id="{42EAF3E5-A60A-4045-81A1-06B04AB73184}"/>
+              </a:ext>
+            </a:extLst>
+          </p:cNvPr>
+          <p:cNvSpPr>
+            <a:spLocks noGrp="1"/>
+          </p:cNvSpPr>
+          <p:nvPr>
+            <p:ph type="title"/>
+          </p:nvPr>
+        </p:nvSpPr>
+        <p:spPr>
+          <a:xfrm>
+            <a:off x="838200" y="2766218"/>
+            <a:ext cx="10515600" cy="1325563"/>
+          </a:xfrm>
+        </p:spPr>
+        <p:txBody>
+          <a:bodyPr>
+            <a:normAutofit/>
+          </a:bodyPr>
+          <a:lstStyle/>
+          <a:p>
+            <a:pPr algn="ctr"/>
+            <a:r>
+              <a:rPr lang="en-US" dirty="0"/>
+              <a:t>Testing</a:t>
+            </a:r>
+          </a:p>
+        </p:txBody>
+      </p:sp>
+    </p:spTree>
+    <p:extLst>
+      <p:ext uri="{BB962C8B-B14F-4D97-AF65-F5344CB8AC3E}">
+        <p14:creationId xmlns:p14="http://schemas.microsoft.com/office/powerpoint/2010/main" val="3751550403"/>
+      </p:ext>
+    </p:extLst>
+  </p:cSld>
+  <p:clrMapOvr>
+    <a:masterClrMapping/>
+  </p:clrMapOvr>
+</p:sld>
+</file>
+
+<file path=ppt/slides/slide44.xml><?xml version="1.0" encoding="utf-8"?>
+<p:sld xmlns:a="http://schemas.openxmlformats.org/drawingml/2006/main" xmlns:r="http://schemas.openxmlformats.org/officeDocument/2006/relationships" xmlns:p="http://schemas.openxmlformats.org/presentationml/2006/main">
+  <p:cSld>
+    <p:spTree>
+      <p:nvGrpSpPr>
+        <p:cNvPr id="1" name=""/>
+        <p:cNvGrpSpPr/>
+        <p:nvPr/>
+      </p:nvGrpSpPr>
+      <p:grpSpPr>
+        <a:xfrm>
+          <a:off x="0" y="0"/>
+          <a:ext cx="0" cy="0"/>
+          <a:chOff x="0" y="0"/>
+          <a:chExt cx="0" cy="0"/>
+        </a:xfrm>
+      </p:grpSpPr>
+      <p:sp>
+        <p:nvSpPr>
+          <p:cNvPr id="2" name="Title 1">
+            <a:extLst>
+              <a:ext uri="{FF2B5EF4-FFF2-40B4-BE49-F238E27FC236}">
+                <a16:creationId xmlns:a16="http://schemas.microsoft.com/office/drawing/2014/main" id="{4E9364F0-88C2-4A49-A3EB-C5BA3059012F}"/>
+              </a:ext>
+            </a:extLst>
+          </p:cNvPr>
+          <p:cNvSpPr>
+            <a:spLocks noGrp="1"/>
+          </p:cNvSpPr>
+          <p:nvPr>
+            <p:ph type="title"/>
+          </p:nvPr>
+        </p:nvSpPr>
+        <p:spPr/>
+        <p:txBody>
+          <a:bodyPr/>
+          <a:lstStyle/>
+          <a:p>
+            <a:r>
+              <a:rPr lang="en-US" dirty="0"/>
+              <a:t>Spring Boot &amp; Testing</a:t>
+            </a:r>
+          </a:p>
+        </p:txBody>
+      </p:sp>
+      <p:sp>
+        <p:nvSpPr>
+          <p:cNvPr id="3" name="Content Placeholder 2">
+            <a:extLst>
+              <a:ext uri="{FF2B5EF4-FFF2-40B4-BE49-F238E27FC236}">
+                <a16:creationId xmlns:a16="http://schemas.microsoft.com/office/drawing/2014/main" id="{05A46316-432D-42CE-B31F-B06F03DCA76D}"/>
+              </a:ext>
+            </a:extLst>
+          </p:cNvPr>
+          <p:cNvSpPr>
+            <a:spLocks noGrp="1"/>
+          </p:cNvSpPr>
+          <p:nvPr>
+            <p:ph idx="1"/>
+          </p:nvPr>
+        </p:nvSpPr>
+        <p:spPr/>
+        <p:txBody>
+          <a:bodyPr/>
+          <a:lstStyle/>
+          <a:p>
+            <a:r>
+              <a:rPr lang="en-US" dirty="0"/>
+              <a:t>You can use dependency injection in tests.</a:t>
+            </a:r>
+          </a:p>
+          <a:p>
+            <a:r>
+              <a:rPr lang="en-US" dirty="0"/>
+              <a:t>Tools for testing requests &amp; responses pretty easily.</a:t>
+            </a:r>
+          </a:p>
+          <a:p>
+            <a:pPr lvl="1"/>
+            <a:r>
+              <a:rPr lang="en-US" dirty="0"/>
+              <a:t>Imagine a Postman request, only it’s configured in Java code.</a:t>
+            </a:r>
+          </a:p>
+        </p:txBody>
+      </p:sp>
+    </p:spTree>
+    <p:extLst>
+      <p:ext uri="{BB962C8B-B14F-4D97-AF65-F5344CB8AC3E}">
+        <p14:creationId xmlns:p14="http://schemas.microsoft.com/office/powerpoint/2010/main" val="3039906883"/>
+      </p:ext>
+    </p:extLst>
+  </p:cSld>
+  <p:clrMapOvr>
+    <a:masterClrMapping/>
+  </p:clrMapOvr>
+</p:sld>
+</file>
+
+<file path=ppt/slides/slide45.xml><?xml version="1.0" encoding="utf-8"?>
+<p:sld xmlns:a="http://schemas.openxmlformats.org/drawingml/2006/main" xmlns:r="http://schemas.openxmlformats.org/officeDocument/2006/relationships" xmlns:p="http://schemas.openxmlformats.org/presentationml/2006/main">
+  <p:cSld>
+    <p:spTree>
+      <p:nvGrpSpPr>
+        <p:cNvPr id="1" name=""/>
+        <p:cNvGrpSpPr/>
+        <p:nvPr/>
+      </p:nvGrpSpPr>
+      <p:grpSpPr>
+        <a:xfrm>
+          <a:off x="0" y="0"/>
+          <a:ext cx="0" cy="0"/>
+          <a:chOff x="0" y="0"/>
+          <a:chExt cx="0" cy="0"/>
+        </a:xfrm>
+      </p:grpSpPr>
+      <p:sp>
+        <p:nvSpPr>
+          <p:cNvPr id="2" name="Title 1">
+            <a:extLst>
+              <a:ext uri="{FF2B5EF4-FFF2-40B4-BE49-F238E27FC236}">
+                <a16:creationId xmlns:a16="http://schemas.microsoft.com/office/drawing/2014/main" id="{E9E161ED-4635-4AA1-9460-248629705983}"/>
+              </a:ext>
+            </a:extLst>
+          </p:cNvPr>
+          <p:cNvSpPr>
+            <a:spLocks noGrp="1"/>
+          </p:cNvSpPr>
+          <p:nvPr>
+            <p:ph type="title"/>
+          </p:nvPr>
+        </p:nvSpPr>
+        <p:spPr/>
+        <p:txBody>
+          <a:bodyPr/>
+          <a:lstStyle/>
+          <a:p>
+            <a:r>
+              <a:rPr lang="en-US" dirty="0"/>
+              <a:t>Testing Annotations</a:t>
+            </a:r>
+          </a:p>
+        </p:txBody>
+      </p:sp>
+      <p:sp>
+        <p:nvSpPr>
+          <p:cNvPr id="3" name="Content Placeholder 2">
+            <a:extLst>
+              <a:ext uri="{FF2B5EF4-FFF2-40B4-BE49-F238E27FC236}">
+                <a16:creationId xmlns:a16="http://schemas.microsoft.com/office/drawing/2014/main" id="{57B242B6-1700-4540-A058-0E2A3881EE7A}"/>
+              </a:ext>
+            </a:extLst>
+          </p:cNvPr>
+          <p:cNvSpPr>
+            <a:spLocks noGrp="1"/>
+          </p:cNvSpPr>
+          <p:nvPr>
+            <p:ph idx="1"/>
+          </p:nvPr>
+        </p:nvSpPr>
+        <p:spPr/>
+        <p:txBody>
+          <a:bodyPr>
+            <a:normAutofit lnSpcReduction="10000"/>
+          </a:bodyPr>
+          <a:lstStyle/>
+          <a:p>
+            <a:r>
+              <a:rPr lang="en-US" dirty="0"/>
+              <a:t>@</a:t>
+            </a:r>
+            <a:r>
+              <a:rPr lang="en-US" dirty="0" err="1"/>
+              <a:t>SpringBootTest</a:t>
+            </a:r>
+            <a:endParaRPr lang="en-US" dirty="0"/>
+          </a:p>
+          <a:p>
+            <a:pPr lvl="1"/>
+            <a:r>
+              <a:rPr lang="en-US" dirty="0"/>
+              <a:t>Enable Spring dependency injection and other features in you tests.</a:t>
+            </a:r>
+          </a:p>
+          <a:p>
+            <a:r>
+              <a:rPr lang="en-US" dirty="0"/>
+              <a:t>@</a:t>
+            </a:r>
+            <a:r>
+              <a:rPr lang="en-US" dirty="0" err="1"/>
+              <a:t>AutoConfigureMockMvc</a:t>
+            </a:r>
+            <a:endParaRPr lang="en-US" dirty="0"/>
+          </a:p>
+          <a:p>
+            <a:pPr lvl="1"/>
+            <a:r>
+              <a:rPr lang="en-US" dirty="0"/>
+              <a:t>Automatically configure a </a:t>
+            </a:r>
+            <a:r>
+              <a:rPr lang="en-US" dirty="0" err="1"/>
+              <a:t>MockMvc</a:t>
+            </a:r>
+            <a:r>
+              <a:rPr lang="en-US" dirty="0"/>
+              <a:t> class to test your API.</a:t>
+            </a:r>
+          </a:p>
+          <a:p>
+            <a:r>
+              <a:rPr lang="en-US" dirty="0"/>
+              <a:t>@</a:t>
+            </a:r>
+            <a:r>
+              <a:rPr lang="en-US" dirty="0" err="1"/>
+              <a:t>ActiveProfiles</a:t>
+            </a:r>
+            <a:r>
+              <a:rPr lang="en-US" dirty="0"/>
+              <a:t>("test")</a:t>
+            </a:r>
+          </a:p>
+          <a:p>
+            <a:pPr lvl="1"/>
+            <a:r>
+              <a:rPr lang="en-US" dirty="0"/>
+              <a:t>Run a test with a particular profile active.</a:t>
+            </a:r>
+          </a:p>
+          <a:p>
+            <a:pPr lvl="1"/>
+            <a:r>
+              <a:rPr lang="en-US" dirty="0"/>
+              <a:t>Yes, this ties in with </a:t>
+            </a:r>
+            <a:r>
+              <a:rPr lang="en-US" dirty="0" err="1"/>
+              <a:t>application.properties</a:t>
+            </a:r>
+            <a:endParaRPr lang="en-US" dirty="0"/>
+          </a:p>
+          <a:p>
+            <a:pPr lvl="1"/>
+            <a:r>
+              <a:rPr lang="en-US" dirty="0"/>
+              <a:t>For example, application-</a:t>
+            </a:r>
+            <a:r>
+              <a:rPr lang="en-US" dirty="0" err="1"/>
+              <a:t>test.properties</a:t>
+            </a:r>
+            <a:r>
+              <a:rPr lang="en-US" dirty="0"/>
+              <a:t> could be loaded.</a:t>
+            </a:r>
+          </a:p>
+          <a:p>
+            <a:r>
+              <a:rPr lang="en-US" dirty="0"/>
+              <a:t>@Test</a:t>
+            </a:r>
+          </a:p>
+          <a:p>
+            <a:pPr lvl="1"/>
+            <a:r>
+              <a:rPr lang="en-US" dirty="0"/>
+              <a:t>Marks methods that perform tests.</a:t>
+            </a:r>
+          </a:p>
+        </p:txBody>
+      </p:sp>
+    </p:spTree>
+    <p:extLst>
+      <p:ext uri="{BB962C8B-B14F-4D97-AF65-F5344CB8AC3E}">
+        <p14:creationId xmlns:p14="http://schemas.microsoft.com/office/powerpoint/2010/main" val="1933074668"/>
       </p:ext>
     </p:extLst>
   </p:cSld>
@@ -8972,18 +9899,18 @@
 </file>
 
 <file path=customXml/item2.xml><?xml version="1.0" encoding="utf-8"?>
+<p:properties xmlns:p="http://schemas.microsoft.com/office/2006/metadata/properties" xmlns:xsi="http://www.w3.org/2001/XMLSchema-instance" xmlns:pc="http://schemas.microsoft.com/office/infopath/2007/PartnerControls">
+  <documentManagement/>
+</p:properties>
+</file>
+
+<file path=customXml/item3.xml><?xml version="1.0" encoding="utf-8"?>
 <?mso-contentType ?>
 <FormTemplates xmlns="http://schemas.microsoft.com/sharepoint/v3/contenttype/forms">
   <Display>DocumentLibraryForm</Display>
   <Edit>DocumentLibraryForm</Edit>
   <New>DocumentLibraryForm</New>
 </FormTemplates>
-</file>
-
-<file path=customXml/item3.xml><?xml version="1.0" encoding="utf-8"?>
-<p:properties xmlns:p="http://schemas.microsoft.com/office/2006/metadata/properties" xmlns:xsi="http://www.w3.org/2001/XMLSchema-instance" xmlns:pc="http://schemas.microsoft.com/office/infopath/2007/PartnerControls">
-  <documentManagement/>
-</p:properties>
 </file>
 
 <file path=customXml/itemProps1.xml><?xml version="1.0" encoding="utf-8"?>
@@ -9005,25 +9932,25 @@
 </file>
 
 <file path=customXml/itemProps2.xml><?xml version="1.0" encoding="utf-8"?>
+<ds:datastoreItem xmlns:ds="http://schemas.openxmlformats.org/officeDocument/2006/customXml" ds:itemID="{EE47E264-E74C-4008-9259-F3B8ADBCEB68}">
+  <ds:schemaRefs>
+    <ds:schemaRef ds:uri="756bce03-edf8-48a8-8c33-845f97040487"/>
+    <ds:schemaRef ds:uri="http://www.w3.org/XML/1998/namespace"/>
+    <ds:schemaRef ds:uri="http://schemas.microsoft.com/office/2006/metadata/properties"/>
+    <ds:schemaRef ds:uri="http://schemas.microsoft.com/office/2006/documentManagement/types"/>
+    <ds:schemaRef ds:uri="http://purl.org/dc/dcmitype/"/>
+    <ds:schemaRef ds:uri="http://purl.org/dc/elements/1.1/"/>
+    <ds:schemaRef ds:uri="http://schemas.microsoft.com/office/infopath/2007/PartnerControls"/>
+    <ds:schemaRef ds:uri="http://schemas.openxmlformats.org/package/2006/metadata/core-properties"/>
+    <ds:schemaRef ds:uri="http://purl.org/dc/terms/"/>
+  </ds:schemaRefs>
+</ds:datastoreItem>
+</file>
+
+<file path=customXml/itemProps3.xml><?xml version="1.0" encoding="utf-8"?>
 <ds:datastoreItem xmlns:ds="http://schemas.openxmlformats.org/officeDocument/2006/customXml" ds:itemID="{3BDF0219-55C7-4A15-928C-4D08467C77EB}">
   <ds:schemaRefs>
     <ds:schemaRef ds:uri="http://schemas.microsoft.com/sharepoint/v3/contenttype/forms"/>
   </ds:schemaRefs>
 </ds:datastoreItem>
-</file>
-
-<file path=customXml/itemProps3.xml><?xml version="1.0" encoding="utf-8"?>
-<ds:datastoreItem xmlns:ds="http://schemas.openxmlformats.org/officeDocument/2006/customXml" ds:itemID="{EE47E264-E74C-4008-9259-F3B8ADBCEB68}">
-  <ds:schemaRefs>
-    <ds:schemaRef ds:uri="http://schemas.microsoft.com/office/2006/documentManagement/types"/>
-    <ds:schemaRef ds:uri="http://purl.org/dc/dcmitype/"/>
-    <ds:schemaRef ds:uri="http://purl.org/dc/elements/1.1/"/>
-    <ds:schemaRef ds:uri="http://purl.org/dc/terms/"/>
-    <ds:schemaRef ds:uri="http://schemas.microsoft.com/office/2006/metadata/properties"/>
-    <ds:schemaRef ds:uri="http://schemas.openxmlformats.org/package/2006/metadata/core-properties"/>
-    <ds:schemaRef ds:uri="http://www.w3.org/XML/1998/namespace"/>
-    <ds:schemaRef ds:uri="756bce03-edf8-48a8-8c33-845f97040487"/>
-    <ds:schemaRef ds:uri="http://schemas.microsoft.com/office/infopath/2007/PartnerControls"/>
-  </ds:schemaRefs>
-</ds:datastoreItem>
 </file>
</xml_diff>